<commit_message>
updating 9, adding 10
</commit_message>
<xml_diff>
--- a/STT465_9.pptx
+++ b/STT465_9.pptx
@@ -5,7 +5,7 @@
     <p:sldMasterId id="2147483648" r:id="rId1"/>
   </p:sldMasterIdLst>
   <p:notesMasterIdLst>
-    <p:notesMasterId r:id="rId19"/>
+    <p:notesMasterId r:id="rId15"/>
   </p:notesMasterIdLst>
   <p:sldIdLst>
     <p:sldId id="338" r:id="rId2"/>
@@ -21,10 +21,6 @@
     <p:sldId id="366" r:id="rId12"/>
     <p:sldId id="367" r:id="rId13"/>
     <p:sldId id="368" r:id="rId14"/>
-    <p:sldId id="369" r:id="rId15"/>
-    <p:sldId id="370" r:id="rId16"/>
-    <p:sldId id="371" r:id="rId17"/>
-    <p:sldId id="372" r:id="rId18"/>
   </p:sldIdLst>
   <p:sldSz cx="9144000" cy="6858000" type="screen4x3"/>
   <p:notesSz cx="6858000" cy="9144000"/>
@@ -215,7 +211,7 @@
             <a:fld id="{EC2AD4C0-0FC1-44D9-A720-D776D6428221}" type="datetimeFigureOut">
               <a:rPr lang="en-US" smtClean="0"/>
               <a:pPr/>
-              <a:t>10/19/15</a:t>
+              <a:t>10/21/15</a:t>
             </a:fld>
             <a:endParaRPr lang="en-US"/>
           </a:p>
@@ -896,334 +892,6 @@
 </p:notes>
 </file>
 
-<file path=ppt/notesSlides/notesSlide14.xml><?xml version="1.0" encoding="utf-8"?>
-<p:notes xmlns:a="http://schemas.openxmlformats.org/drawingml/2006/main" xmlns:r="http://schemas.openxmlformats.org/officeDocument/2006/relationships" xmlns:p="http://schemas.openxmlformats.org/presentationml/2006/main">
-  <p:cSld>
-    <p:spTree>
-      <p:nvGrpSpPr>
-        <p:cNvPr id="1" name=""/>
-        <p:cNvGrpSpPr/>
-        <p:nvPr/>
-      </p:nvGrpSpPr>
-      <p:grpSpPr>
-        <a:xfrm>
-          <a:off x="0" y="0"/>
-          <a:ext cx="0" cy="0"/>
-          <a:chOff x="0" y="0"/>
-          <a:chExt cx="0" cy="0"/>
-        </a:xfrm>
-      </p:grpSpPr>
-      <p:sp>
-        <p:nvSpPr>
-          <p:cNvPr id="2" name="Slide Image Placeholder 1"/>
-          <p:cNvSpPr>
-            <a:spLocks noGrp="1" noRot="1" noChangeAspect="1"/>
-          </p:cNvSpPr>
-          <p:nvPr>
-            <p:ph type="sldImg"/>
-          </p:nvPr>
-        </p:nvSpPr>
-        <p:spPr/>
-      </p:sp>
-      <p:sp>
-        <p:nvSpPr>
-          <p:cNvPr id="3" name="Notes Placeholder 2"/>
-          <p:cNvSpPr>
-            <a:spLocks noGrp="1"/>
-          </p:cNvSpPr>
-          <p:nvPr>
-            <p:ph type="body" idx="1"/>
-          </p:nvPr>
-        </p:nvSpPr>
-        <p:spPr/>
-        <p:txBody>
-          <a:bodyPr>
-            <a:normAutofit/>
-          </a:bodyPr>
-          <a:lstStyle/>
-          <a:p>
-            <a:endParaRPr lang="en-US" dirty="0"/>
-          </a:p>
-        </p:txBody>
-      </p:sp>
-      <p:sp>
-        <p:nvSpPr>
-          <p:cNvPr id="4" name="Slide Number Placeholder 3"/>
-          <p:cNvSpPr>
-            <a:spLocks noGrp="1"/>
-          </p:cNvSpPr>
-          <p:nvPr>
-            <p:ph type="sldNum" sz="quarter" idx="10"/>
-          </p:nvPr>
-        </p:nvSpPr>
-        <p:spPr/>
-        <p:txBody>
-          <a:bodyPr/>
-          <a:lstStyle/>
-          <a:p>
-            <a:fld id="{CACBEE2F-8C26-493F-9430-82D1D1B7C623}" type="slidenum">
-              <a:rPr lang="en-US" smtClean="0"/>
-              <a:pPr/>
-              <a:t>14</a:t>
-            </a:fld>
-            <a:endParaRPr lang="en-US"/>
-          </a:p>
-        </p:txBody>
-      </p:sp>
-    </p:spTree>
-  </p:cSld>
-  <p:clrMapOvr>
-    <a:masterClrMapping/>
-  </p:clrMapOvr>
-</p:notes>
-</file>
-
-<file path=ppt/notesSlides/notesSlide15.xml><?xml version="1.0" encoding="utf-8"?>
-<p:notes xmlns:a="http://schemas.openxmlformats.org/drawingml/2006/main" xmlns:r="http://schemas.openxmlformats.org/officeDocument/2006/relationships" xmlns:p="http://schemas.openxmlformats.org/presentationml/2006/main">
-  <p:cSld>
-    <p:spTree>
-      <p:nvGrpSpPr>
-        <p:cNvPr id="1" name=""/>
-        <p:cNvGrpSpPr/>
-        <p:nvPr/>
-      </p:nvGrpSpPr>
-      <p:grpSpPr>
-        <a:xfrm>
-          <a:off x="0" y="0"/>
-          <a:ext cx="0" cy="0"/>
-          <a:chOff x="0" y="0"/>
-          <a:chExt cx="0" cy="0"/>
-        </a:xfrm>
-      </p:grpSpPr>
-      <p:sp>
-        <p:nvSpPr>
-          <p:cNvPr id="2" name="Slide Image Placeholder 1"/>
-          <p:cNvSpPr>
-            <a:spLocks noGrp="1" noRot="1" noChangeAspect="1"/>
-          </p:cNvSpPr>
-          <p:nvPr>
-            <p:ph type="sldImg"/>
-          </p:nvPr>
-        </p:nvSpPr>
-        <p:spPr/>
-      </p:sp>
-      <p:sp>
-        <p:nvSpPr>
-          <p:cNvPr id="3" name="Notes Placeholder 2"/>
-          <p:cNvSpPr>
-            <a:spLocks noGrp="1"/>
-          </p:cNvSpPr>
-          <p:nvPr>
-            <p:ph type="body" idx="1"/>
-          </p:nvPr>
-        </p:nvSpPr>
-        <p:spPr/>
-        <p:txBody>
-          <a:bodyPr>
-            <a:normAutofit/>
-          </a:bodyPr>
-          <a:lstStyle/>
-          <a:p>
-            <a:endParaRPr lang="en-US" dirty="0"/>
-          </a:p>
-        </p:txBody>
-      </p:sp>
-      <p:sp>
-        <p:nvSpPr>
-          <p:cNvPr id="4" name="Slide Number Placeholder 3"/>
-          <p:cNvSpPr>
-            <a:spLocks noGrp="1"/>
-          </p:cNvSpPr>
-          <p:nvPr>
-            <p:ph type="sldNum" sz="quarter" idx="10"/>
-          </p:nvPr>
-        </p:nvSpPr>
-        <p:spPr/>
-        <p:txBody>
-          <a:bodyPr/>
-          <a:lstStyle/>
-          <a:p>
-            <a:fld id="{CACBEE2F-8C26-493F-9430-82D1D1B7C623}" type="slidenum">
-              <a:rPr lang="en-US" smtClean="0"/>
-              <a:pPr/>
-              <a:t>15</a:t>
-            </a:fld>
-            <a:endParaRPr lang="en-US"/>
-          </a:p>
-        </p:txBody>
-      </p:sp>
-    </p:spTree>
-  </p:cSld>
-  <p:clrMapOvr>
-    <a:masterClrMapping/>
-  </p:clrMapOvr>
-</p:notes>
-</file>
-
-<file path=ppt/notesSlides/notesSlide16.xml><?xml version="1.0" encoding="utf-8"?>
-<p:notes xmlns:a="http://schemas.openxmlformats.org/drawingml/2006/main" xmlns:r="http://schemas.openxmlformats.org/officeDocument/2006/relationships" xmlns:p="http://schemas.openxmlformats.org/presentationml/2006/main">
-  <p:cSld>
-    <p:spTree>
-      <p:nvGrpSpPr>
-        <p:cNvPr id="1" name=""/>
-        <p:cNvGrpSpPr/>
-        <p:nvPr/>
-      </p:nvGrpSpPr>
-      <p:grpSpPr>
-        <a:xfrm>
-          <a:off x="0" y="0"/>
-          <a:ext cx="0" cy="0"/>
-          <a:chOff x="0" y="0"/>
-          <a:chExt cx="0" cy="0"/>
-        </a:xfrm>
-      </p:grpSpPr>
-      <p:sp>
-        <p:nvSpPr>
-          <p:cNvPr id="2" name="Slide Image Placeholder 1"/>
-          <p:cNvSpPr>
-            <a:spLocks noGrp="1" noRot="1" noChangeAspect="1"/>
-          </p:cNvSpPr>
-          <p:nvPr>
-            <p:ph type="sldImg"/>
-          </p:nvPr>
-        </p:nvSpPr>
-        <p:spPr/>
-      </p:sp>
-      <p:sp>
-        <p:nvSpPr>
-          <p:cNvPr id="3" name="Notes Placeholder 2"/>
-          <p:cNvSpPr>
-            <a:spLocks noGrp="1"/>
-          </p:cNvSpPr>
-          <p:nvPr>
-            <p:ph type="body" idx="1"/>
-          </p:nvPr>
-        </p:nvSpPr>
-        <p:spPr/>
-        <p:txBody>
-          <a:bodyPr>
-            <a:normAutofit/>
-          </a:bodyPr>
-          <a:lstStyle/>
-          <a:p>
-            <a:endParaRPr lang="en-US" dirty="0"/>
-          </a:p>
-        </p:txBody>
-      </p:sp>
-      <p:sp>
-        <p:nvSpPr>
-          <p:cNvPr id="4" name="Slide Number Placeholder 3"/>
-          <p:cNvSpPr>
-            <a:spLocks noGrp="1"/>
-          </p:cNvSpPr>
-          <p:nvPr>
-            <p:ph type="sldNum" sz="quarter" idx="10"/>
-          </p:nvPr>
-        </p:nvSpPr>
-        <p:spPr/>
-        <p:txBody>
-          <a:bodyPr/>
-          <a:lstStyle/>
-          <a:p>
-            <a:fld id="{CACBEE2F-8C26-493F-9430-82D1D1B7C623}" type="slidenum">
-              <a:rPr lang="en-US" smtClean="0"/>
-              <a:pPr/>
-              <a:t>16</a:t>
-            </a:fld>
-            <a:endParaRPr lang="en-US"/>
-          </a:p>
-        </p:txBody>
-      </p:sp>
-    </p:spTree>
-  </p:cSld>
-  <p:clrMapOvr>
-    <a:masterClrMapping/>
-  </p:clrMapOvr>
-</p:notes>
-</file>
-
-<file path=ppt/notesSlides/notesSlide17.xml><?xml version="1.0" encoding="utf-8"?>
-<p:notes xmlns:a="http://schemas.openxmlformats.org/drawingml/2006/main" xmlns:r="http://schemas.openxmlformats.org/officeDocument/2006/relationships" xmlns:p="http://schemas.openxmlformats.org/presentationml/2006/main">
-  <p:cSld>
-    <p:spTree>
-      <p:nvGrpSpPr>
-        <p:cNvPr id="1" name=""/>
-        <p:cNvGrpSpPr/>
-        <p:nvPr/>
-      </p:nvGrpSpPr>
-      <p:grpSpPr>
-        <a:xfrm>
-          <a:off x="0" y="0"/>
-          <a:ext cx="0" cy="0"/>
-          <a:chOff x="0" y="0"/>
-          <a:chExt cx="0" cy="0"/>
-        </a:xfrm>
-      </p:grpSpPr>
-      <p:sp>
-        <p:nvSpPr>
-          <p:cNvPr id="2" name="Slide Image Placeholder 1"/>
-          <p:cNvSpPr>
-            <a:spLocks noGrp="1" noRot="1" noChangeAspect="1"/>
-          </p:cNvSpPr>
-          <p:nvPr>
-            <p:ph type="sldImg"/>
-          </p:nvPr>
-        </p:nvSpPr>
-        <p:spPr/>
-      </p:sp>
-      <p:sp>
-        <p:nvSpPr>
-          <p:cNvPr id="3" name="Notes Placeholder 2"/>
-          <p:cNvSpPr>
-            <a:spLocks noGrp="1"/>
-          </p:cNvSpPr>
-          <p:nvPr>
-            <p:ph type="body" idx="1"/>
-          </p:nvPr>
-        </p:nvSpPr>
-        <p:spPr/>
-        <p:txBody>
-          <a:bodyPr>
-            <a:normAutofit/>
-          </a:bodyPr>
-          <a:lstStyle/>
-          <a:p>
-            <a:endParaRPr lang="en-US" dirty="0"/>
-          </a:p>
-        </p:txBody>
-      </p:sp>
-      <p:sp>
-        <p:nvSpPr>
-          <p:cNvPr id="4" name="Slide Number Placeholder 3"/>
-          <p:cNvSpPr>
-            <a:spLocks noGrp="1"/>
-          </p:cNvSpPr>
-          <p:nvPr>
-            <p:ph type="sldNum" sz="quarter" idx="10"/>
-          </p:nvPr>
-        </p:nvSpPr>
-        <p:spPr/>
-        <p:txBody>
-          <a:bodyPr/>
-          <a:lstStyle/>
-          <a:p>
-            <a:fld id="{CACBEE2F-8C26-493F-9430-82D1D1B7C623}" type="slidenum">
-              <a:rPr lang="en-US" smtClean="0"/>
-              <a:pPr/>
-              <a:t>17</a:t>
-            </a:fld>
-            <a:endParaRPr lang="en-US"/>
-          </a:p>
-        </p:txBody>
-      </p:sp>
-    </p:spTree>
-  </p:cSld>
-  <p:clrMapOvr>
-    <a:masterClrMapping/>
-  </p:clrMapOvr>
-</p:notes>
-</file>
-
 <file path=ppt/notesSlides/notesSlide2.xml><?xml version="1.0" encoding="utf-8"?>
 <p:notes xmlns:a="http://schemas.openxmlformats.org/drawingml/2006/main" xmlns:r="http://schemas.openxmlformats.org/officeDocument/2006/relationships" xmlns:p="http://schemas.openxmlformats.org/presentationml/2006/main">
   <p:cSld>
@@ -2062,7 +1730,7 @@
             <a:fld id="{F9C811E6-0209-4075-80E7-F5953C8ECEE3}" type="datetime1">
               <a:rPr lang="en-US" smtClean="0"/>
               <a:pPr/>
-              <a:t>10/19/15</a:t>
+              <a:t>10/21/15</a:t>
             </a:fld>
             <a:endParaRPr lang="en-US"/>
           </a:p>
@@ -2233,7 +1901,7 @@
             <a:fld id="{648E6BB1-E6D9-4EE7-828F-046F7223761D}" type="datetime1">
               <a:rPr lang="en-US" smtClean="0"/>
               <a:pPr/>
-              <a:t>10/19/15</a:t>
+              <a:t>10/21/15</a:t>
             </a:fld>
             <a:endParaRPr lang="en-US"/>
           </a:p>
@@ -2414,7 +2082,7 @@
             <a:fld id="{B4B9C580-A780-4D76-B2D1-C34F1DA97DF0}" type="datetime1">
               <a:rPr lang="en-US" smtClean="0"/>
               <a:pPr/>
-              <a:t>10/19/15</a:t>
+              <a:t>10/21/15</a:t>
             </a:fld>
             <a:endParaRPr lang="en-US"/>
           </a:p>
@@ -2585,7 +2253,7 @@
             <a:fld id="{EB19DDAF-3255-4785-974C-BB4FAF02D67E}" type="datetime1">
               <a:rPr lang="en-US" smtClean="0"/>
               <a:pPr/>
-              <a:t>10/19/15</a:t>
+              <a:t>10/21/15</a:t>
             </a:fld>
             <a:endParaRPr lang="en-US"/>
           </a:p>
@@ -2832,7 +2500,7 @@
             <a:fld id="{C344AF86-11D1-4E84-BA60-17130236FDAA}" type="datetime1">
               <a:rPr lang="en-US" smtClean="0"/>
               <a:pPr/>
-              <a:t>10/19/15</a:t>
+              <a:t>10/21/15</a:t>
             </a:fld>
             <a:endParaRPr lang="en-US"/>
           </a:p>
@@ -3121,7 +2789,7 @@
             <a:fld id="{A8DD670F-7E07-4783-A6F8-B28127B5AF4A}" type="datetime1">
               <a:rPr lang="en-US" smtClean="0"/>
               <a:pPr/>
-              <a:t>10/19/15</a:t>
+              <a:t>10/21/15</a:t>
             </a:fld>
             <a:endParaRPr lang="en-US"/>
           </a:p>
@@ -3544,7 +3212,7 @@
             <a:fld id="{92676DD9-688F-48EE-8233-B3B78BDDA63D}" type="datetime1">
               <a:rPr lang="en-US" smtClean="0"/>
               <a:pPr/>
-              <a:t>10/19/15</a:t>
+              <a:t>10/21/15</a:t>
             </a:fld>
             <a:endParaRPr lang="en-US"/>
           </a:p>
@@ -3663,7 +3331,7 @@
             <a:fld id="{F6CC4A83-AE34-48B8-B90E-70388FDBF0F7}" type="datetime1">
               <a:rPr lang="en-US" smtClean="0"/>
               <a:pPr/>
-              <a:t>10/19/15</a:t>
+              <a:t>10/21/15</a:t>
             </a:fld>
             <a:endParaRPr lang="en-US"/>
           </a:p>
@@ -3759,7 +3427,7 @@
             <a:fld id="{510CA3E2-9601-488E-B92B-23013819BD02}" type="datetime1">
               <a:rPr lang="en-US" smtClean="0"/>
               <a:pPr/>
-              <a:t>10/19/15</a:t>
+              <a:t>10/21/15</a:t>
             </a:fld>
             <a:endParaRPr lang="en-US"/>
           </a:p>
@@ -4037,7 +3705,7 @@
             <a:fld id="{331F1CBD-358A-4E18-86FD-C337233E15F0}" type="datetime1">
               <a:rPr lang="en-US" smtClean="0"/>
               <a:pPr/>
-              <a:t>10/19/15</a:t>
+              <a:t>10/21/15</a:t>
             </a:fld>
             <a:endParaRPr lang="en-US"/>
           </a:p>
@@ -4291,7 +3959,7 @@
             <a:fld id="{3CB4F0D5-901F-4458-A8F8-F062616694B4}" type="datetime1">
               <a:rPr lang="en-US" smtClean="0"/>
               <a:pPr/>
-              <a:t>10/19/15</a:t>
+              <a:t>10/21/15</a:t>
             </a:fld>
             <a:endParaRPr lang="en-US"/>
           </a:p>
@@ -4505,7 +4173,7 @@
             <a:fld id="{F77D84EF-BDBF-448B-906E-D51D4CAF22DC}" type="datetime1">
               <a:rPr lang="en-US" smtClean="0"/>
               <a:pPr/>
-              <a:t>10/19/15</a:t>
+              <a:t>10/21/15</a:t>
             </a:fld>
             <a:endParaRPr lang="en-US"/>
           </a:p>
@@ -4959,7 +4627,36 @@
                   </a:schemeClr>
                 </a:solidFill>
               </a:rPr>
-              <a:t>I. Multiple Linear Regression (MLE/OLS)</a:t>
+              <a:t>I. Multiple Linear </a:t>
+            </a:r>
+            <a:r>
+              <a:rPr lang="en-US" sz="3200" dirty="0">
+                <a:solidFill>
+                  <a:schemeClr val="accent2">
+                    <a:lumMod val="75000"/>
+                  </a:schemeClr>
+                </a:solidFill>
+              </a:rPr>
+              <a:t/>
+            </a:r>
+            <a:br>
+              <a:rPr lang="en-US" sz="3200" dirty="0">
+                <a:solidFill>
+                  <a:schemeClr val="accent2">
+                    <a:lumMod val="75000"/>
+                  </a:schemeClr>
+                </a:solidFill>
+              </a:rPr>
+            </a:br>
+            <a:r>
+              <a:rPr lang="en-US" sz="3200" dirty="0" smtClean="0">
+                <a:solidFill>
+                  <a:schemeClr val="accent2">
+                    <a:lumMod val="75000"/>
+                  </a:schemeClr>
+                </a:solidFill>
+              </a:rPr>
+              <a:t>II. OLS Estimation</a:t>
             </a:r>
             <a:br>
               <a:rPr lang="en-US" sz="3200" dirty="0" smtClean="0">
@@ -4978,27 +4675,15 @@
                   </a:schemeClr>
                 </a:solidFill>
               </a:rPr>
-              <a:t>II. Multivariate Normal Distribution</a:t>
-            </a:r>
-            <a:br>
-              <a:rPr lang="en-US" sz="3200" dirty="0" smtClean="0">
-                <a:solidFill>
-                  <a:schemeClr val="accent2">
-                    <a:lumMod val="75000"/>
-                  </a:schemeClr>
-                </a:solidFill>
-              </a:rPr>
-            </a:br>
-            <a:r>
-              <a:rPr lang="en-US" sz="3200" dirty="0" smtClean="0">
-                <a:solidFill>
-                  <a:schemeClr val="accent2">
-                    <a:lumMod val="75000"/>
-                  </a:schemeClr>
-                </a:solidFill>
-              </a:rPr>
-              <a:t>II. Bayesian Multiple Linear Regression</a:t>
-            </a:r>
+              <a:t>III. Max. Likelihood</a:t>
+            </a:r>
+            <a:endParaRPr lang="en-US" sz="3200" dirty="0" smtClean="0">
+              <a:solidFill>
+                <a:schemeClr val="accent2">
+                  <a:lumMod val="75000"/>
+                </a:schemeClr>
+              </a:solidFill>
+            </a:endParaRPr>
           </a:p>
         </p:txBody>
       </p:sp>
@@ -5353,7 +5038,7 @@
           <a:graphicData uri="http://schemas.openxmlformats.org/presentationml/2006/ole">
             <mc:AlternateContent xmlns:mc="http://schemas.openxmlformats.org/markup-compatibility/2006">
               <mc:Choice xmlns:v="urn:schemas-microsoft-com:vml" Requires="v">
-                <p:oleObj spid="_x0000_s14344" name="Equation" r:id="rId4" imgW="952500" imgH="469900" progId="Equation.3">
+                <p:oleObj spid="_x0000_s14347" name="Equation" r:id="rId4" imgW="952500" imgH="469900" progId="Equation.3">
                   <p:embed/>
                 </p:oleObj>
               </mc:Choice>
@@ -5410,7 +5095,7 @@
           <a:graphicData uri="http://schemas.openxmlformats.org/presentationml/2006/ole">
             <mc:AlternateContent xmlns:mc="http://schemas.openxmlformats.org/markup-compatibility/2006">
               <mc:Choice xmlns:v="urn:schemas-microsoft-com:vml" Requires="v">
-                <p:oleObj spid="_x0000_s14345" name="Equation" r:id="rId6" imgW="3175000" imgH="1333500" progId="Equation.3">
+                <p:oleObj spid="_x0000_s14348" name="Equation" r:id="rId6" imgW="3175000" imgH="1333500" progId="Equation.3">
                   <p:embed/>
                 </p:oleObj>
               </mc:Choice>
@@ -5802,7 +5487,7 @@
           <a:graphicData uri="http://schemas.openxmlformats.org/presentationml/2006/ole">
             <mc:AlternateContent xmlns:mc="http://schemas.openxmlformats.org/markup-compatibility/2006">
               <mc:Choice xmlns:v="urn:schemas-microsoft-com:vml" Requires="v">
-                <p:oleObj spid="_x0000_s15374" name="Equation" r:id="rId4" imgW="952500" imgH="469900" progId="Equation.3">
+                <p:oleObj spid="_x0000_s15378" name="Equation" r:id="rId4" imgW="952500" imgH="469900" progId="Equation.3">
                   <p:embed/>
                 </p:oleObj>
               </mc:Choice>
@@ -5859,7 +5544,7 @@
           <a:graphicData uri="http://schemas.openxmlformats.org/presentationml/2006/ole">
             <mc:AlternateContent xmlns:mc="http://schemas.openxmlformats.org/markup-compatibility/2006">
               <mc:Choice xmlns:v="urn:schemas-microsoft-com:vml" Requires="v">
-                <p:oleObj spid="_x0000_s15375" name="Equation" r:id="rId6" imgW="3403600" imgH="317500" progId="Equation.3">
+                <p:oleObj spid="_x0000_s15379" name="Equation" r:id="rId6" imgW="3403600" imgH="317500" progId="Equation.3">
                   <p:embed/>
                 </p:oleObj>
               </mc:Choice>
@@ -5916,7 +5601,7 @@
           <a:graphicData uri="http://schemas.openxmlformats.org/presentationml/2006/ole">
             <mc:AlternateContent xmlns:mc="http://schemas.openxmlformats.org/markup-compatibility/2006">
               <mc:Choice xmlns:v="urn:schemas-microsoft-com:vml" Requires="v">
-                <p:oleObj spid="_x0000_s15376" name="Equation" r:id="rId8" imgW="1524000" imgH="520700" progId="Equation.3">
+                <p:oleObj spid="_x0000_s15380" name="Equation" r:id="rId8" imgW="1524000" imgH="520700" progId="Equation.3">
                   <p:embed/>
                 </p:oleObj>
               </mc:Choice>
@@ -6631,1936 +6316,6 @@
 </p:sld>
 </file>
 
-<file path=ppt/slides/slide14.xml><?xml version="1.0" encoding="utf-8"?>
-<p:sld xmlns:a="http://schemas.openxmlformats.org/drawingml/2006/main" xmlns:r="http://schemas.openxmlformats.org/officeDocument/2006/relationships" xmlns:p="http://schemas.openxmlformats.org/presentationml/2006/main">
-  <p:cSld>
-    <p:spTree>
-      <p:nvGrpSpPr>
-        <p:cNvPr id="1" name=""/>
-        <p:cNvGrpSpPr/>
-        <p:nvPr/>
-      </p:nvGrpSpPr>
-      <p:grpSpPr>
-        <a:xfrm>
-          <a:off x="0" y="0"/>
-          <a:ext cx="0" cy="0"/>
-          <a:chOff x="0" y="0"/>
-          <a:chExt cx="0" cy="0"/>
-        </a:xfrm>
-      </p:grpSpPr>
-      <p:sp>
-        <p:nvSpPr>
-          <p:cNvPr id="2" name="Title 1"/>
-          <p:cNvSpPr>
-            <a:spLocks noGrp="1"/>
-          </p:cNvSpPr>
-          <p:nvPr>
-            <p:ph type="ctrTitle"/>
-          </p:nvPr>
-        </p:nvSpPr>
-        <p:spPr>
-          <a:xfrm>
-            <a:off x="381000" y="33077"/>
-            <a:ext cx="8382000" cy="762000"/>
-          </a:xfrm>
-        </p:spPr>
-        <p:txBody>
-          <a:bodyPr>
-            <a:normAutofit/>
-          </a:bodyPr>
-          <a:lstStyle/>
-          <a:p>
-            <a:r>
-              <a:rPr lang="en-US" sz="3200" dirty="0" smtClean="0">
-                <a:solidFill>
-                  <a:schemeClr val="accent2">
-                    <a:lumMod val="75000"/>
-                  </a:schemeClr>
-                </a:solidFill>
-              </a:rPr>
-              <a:t>Multivariate Normal Distribution</a:t>
-            </a:r>
-            <a:endParaRPr lang="en-US" sz="3200" dirty="0">
-              <a:solidFill>
-                <a:schemeClr val="accent2">
-                  <a:lumMod val="75000"/>
-                </a:schemeClr>
-              </a:solidFill>
-            </a:endParaRPr>
-          </a:p>
-        </p:txBody>
-      </p:sp>
-      <p:sp>
-        <p:nvSpPr>
-          <p:cNvPr id="4" name="Footer Placeholder 3"/>
-          <p:cNvSpPr>
-            <a:spLocks noGrp="1"/>
-          </p:cNvSpPr>
-          <p:nvPr>
-            <p:ph type="ftr" sz="quarter" idx="11"/>
-          </p:nvPr>
-        </p:nvSpPr>
-        <p:spPr/>
-        <p:txBody>
-          <a:bodyPr/>
-          <a:lstStyle/>
-          <a:p>
-            <a:r>
-              <a:rPr lang="en-US" dirty="0" smtClean="0">
-                <a:solidFill>
-                  <a:schemeClr val="accent1"/>
-                </a:solidFill>
-              </a:rPr>
-              <a:t>STT 465, MSU, Fall, 2015</a:t>
-            </a:r>
-            <a:endParaRPr lang="en-US" dirty="0">
-              <a:solidFill>
-                <a:schemeClr val="accent1"/>
-              </a:solidFill>
-            </a:endParaRPr>
-          </a:p>
-        </p:txBody>
-      </p:sp>
-      <p:sp>
-        <p:nvSpPr>
-          <p:cNvPr id="6" name="TextBox 5"/>
-          <p:cNvSpPr txBox="1"/>
-          <p:nvPr/>
-        </p:nvSpPr>
-        <p:spPr>
-          <a:xfrm>
-            <a:off x="304800" y="762000"/>
-            <a:ext cx="8229600" cy="5632312"/>
-          </a:xfrm>
-          <a:prstGeom prst="rect">
-            <a:avLst/>
-          </a:prstGeom>
-          <a:noFill/>
-          <a:ln>
-            <a:solidFill>
-              <a:srgbClr val="800000"/>
-            </a:solidFill>
-            <a:prstDash val="sysDash"/>
-          </a:ln>
-        </p:spPr>
-        <p:txBody>
-          <a:bodyPr wrap="square" rtlCol="0">
-            <a:spAutoFit/>
-          </a:bodyPr>
-          <a:lstStyle/>
-          <a:p>
-            <a:endParaRPr lang="en-US" dirty="0" smtClean="0">
-              <a:solidFill>
-                <a:schemeClr val="accent1">
-                  <a:lumMod val="75000"/>
-                </a:schemeClr>
-              </a:solidFill>
-            </a:endParaRPr>
-          </a:p>
-          <a:p>
-            <a:endParaRPr lang="en-US" dirty="0">
-              <a:solidFill>
-                <a:schemeClr val="accent1">
-                  <a:lumMod val="75000"/>
-                </a:schemeClr>
-              </a:solidFill>
-            </a:endParaRPr>
-          </a:p>
-          <a:p>
-            <a:endParaRPr lang="en-US" dirty="0" smtClean="0">
-              <a:solidFill>
-                <a:schemeClr val="accent1">
-                  <a:lumMod val="75000"/>
-                </a:schemeClr>
-              </a:solidFill>
-            </a:endParaRPr>
-          </a:p>
-          <a:p>
-            <a:endParaRPr lang="en-US" dirty="0">
-              <a:solidFill>
-                <a:schemeClr val="accent1">
-                  <a:lumMod val="75000"/>
-                </a:schemeClr>
-              </a:solidFill>
-            </a:endParaRPr>
-          </a:p>
-          <a:p>
-            <a:endParaRPr lang="en-US" dirty="0" smtClean="0">
-              <a:solidFill>
-                <a:schemeClr val="accent1">
-                  <a:lumMod val="75000"/>
-                </a:schemeClr>
-              </a:solidFill>
-            </a:endParaRPr>
-          </a:p>
-          <a:p>
-            <a:endParaRPr lang="en-US" dirty="0">
-              <a:solidFill>
-                <a:schemeClr val="accent1">
-                  <a:lumMod val="75000"/>
-                </a:schemeClr>
-              </a:solidFill>
-            </a:endParaRPr>
-          </a:p>
-          <a:p>
-            <a:endParaRPr lang="en-US" dirty="0" smtClean="0">
-              <a:solidFill>
-                <a:schemeClr val="accent1">
-                  <a:lumMod val="75000"/>
-                </a:schemeClr>
-              </a:solidFill>
-            </a:endParaRPr>
-          </a:p>
-          <a:p>
-            <a:endParaRPr lang="en-US" dirty="0">
-              <a:solidFill>
-                <a:schemeClr val="accent1">
-                  <a:lumMod val="75000"/>
-                </a:schemeClr>
-              </a:solidFill>
-            </a:endParaRPr>
-          </a:p>
-          <a:p>
-            <a:endParaRPr lang="en-US" dirty="0" smtClean="0">
-              <a:solidFill>
-                <a:schemeClr val="accent1">
-                  <a:lumMod val="75000"/>
-                </a:schemeClr>
-              </a:solidFill>
-            </a:endParaRPr>
-          </a:p>
-          <a:p>
-            <a:endParaRPr lang="en-US" dirty="0">
-              <a:solidFill>
-                <a:schemeClr val="accent1">
-                  <a:lumMod val="75000"/>
-                </a:schemeClr>
-              </a:solidFill>
-            </a:endParaRPr>
-          </a:p>
-          <a:p>
-            <a:endParaRPr lang="en-US" dirty="0" smtClean="0">
-              <a:solidFill>
-                <a:schemeClr val="accent1">
-                  <a:lumMod val="75000"/>
-                </a:schemeClr>
-              </a:solidFill>
-            </a:endParaRPr>
-          </a:p>
-          <a:p>
-            <a:endParaRPr lang="en-US" dirty="0">
-              <a:solidFill>
-                <a:schemeClr val="accent1">
-                  <a:lumMod val="75000"/>
-                </a:schemeClr>
-              </a:solidFill>
-            </a:endParaRPr>
-          </a:p>
-          <a:p>
-            <a:endParaRPr lang="en-US" dirty="0" smtClean="0">
-              <a:solidFill>
-                <a:schemeClr val="accent1">
-                  <a:lumMod val="75000"/>
-                </a:schemeClr>
-              </a:solidFill>
-            </a:endParaRPr>
-          </a:p>
-          <a:p>
-            <a:endParaRPr lang="en-US" dirty="0">
-              <a:solidFill>
-                <a:schemeClr val="accent1">
-                  <a:lumMod val="75000"/>
-                </a:schemeClr>
-              </a:solidFill>
-            </a:endParaRPr>
-          </a:p>
-          <a:p>
-            <a:endParaRPr lang="en-US" dirty="0" smtClean="0">
-              <a:solidFill>
-                <a:schemeClr val="accent1">
-                  <a:lumMod val="75000"/>
-                </a:schemeClr>
-              </a:solidFill>
-            </a:endParaRPr>
-          </a:p>
-          <a:p>
-            <a:endParaRPr lang="en-US" dirty="0">
-              <a:solidFill>
-                <a:schemeClr val="accent1">
-                  <a:lumMod val="75000"/>
-                </a:schemeClr>
-              </a:solidFill>
-            </a:endParaRPr>
-          </a:p>
-          <a:p>
-            <a:endParaRPr lang="en-US" dirty="0" smtClean="0">
-              <a:solidFill>
-                <a:schemeClr val="accent1">
-                  <a:lumMod val="75000"/>
-                </a:schemeClr>
-              </a:solidFill>
-            </a:endParaRPr>
-          </a:p>
-          <a:p>
-            <a:endParaRPr lang="en-US" dirty="0">
-              <a:solidFill>
-                <a:schemeClr val="accent1">
-                  <a:lumMod val="75000"/>
-                </a:schemeClr>
-              </a:solidFill>
-            </a:endParaRPr>
-          </a:p>
-          <a:p>
-            <a:endParaRPr lang="en-US" dirty="0" smtClean="0">
-              <a:solidFill>
-                <a:schemeClr val="accent1">
-                  <a:lumMod val="75000"/>
-                </a:schemeClr>
-              </a:solidFill>
-            </a:endParaRPr>
-          </a:p>
-          <a:p>
-            <a:endParaRPr lang="en-US" dirty="0" smtClean="0">
-              <a:solidFill>
-                <a:schemeClr val="accent1">
-                  <a:lumMod val="75000"/>
-                </a:schemeClr>
-              </a:solidFill>
-            </a:endParaRPr>
-          </a:p>
-        </p:txBody>
-      </p:sp>
-      <p:graphicFrame>
-        <p:nvGraphicFramePr>
-          <p:cNvPr id="5" name="Object 4"/>
-          <p:cNvGraphicFramePr>
-            <a:graphicFrameLocks noChangeAspect="1"/>
-          </p:cNvGraphicFramePr>
-          <p:nvPr>
-            <p:extLst>
-              <p:ext uri="{D42A27DB-BD31-4B8C-83A1-F6EECF244321}">
-                <p14:modId xmlns:p14="http://schemas.microsoft.com/office/powerpoint/2010/main" val="574525811"/>
-              </p:ext>
-            </p:extLst>
-          </p:nvPr>
-        </p:nvGraphicFramePr>
-        <p:xfrm>
-          <a:off x="2667000" y="1371600"/>
-          <a:ext cx="2100262" cy="928688"/>
-        </p:xfrm>
-        <a:graphic>
-          <a:graphicData uri="http://schemas.openxmlformats.org/presentationml/2006/ole">
-            <mc:AlternateContent xmlns:mc="http://schemas.openxmlformats.org/markup-compatibility/2006">
-              <mc:Choice xmlns:v="urn:schemas-microsoft-com:vml" Requires="v">
-                <p:oleObj spid="_x0000_s18443" name="Equation" r:id="rId4" imgW="977900" imgH="431800" progId="Equation.3">
-                  <p:embed/>
-                </p:oleObj>
-              </mc:Choice>
-              <mc:Fallback>
-                <p:oleObj name="Equation" r:id="rId4" imgW="977900" imgH="431800" progId="Equation.3">
-                  <p:embed/>
-                  <p:pic>
-                    <p:nvPicPr>
-                      <p:cNvPr id="0" name=""/>
-                      <p:cNvPicPr/>
-                      <p:nvPr/>
-                    </p:nvPicPr>
-                    <p:blipFill>
-                      <a:blip r:embed="rId5"/>
-                      <a:stretch>
-                        <a:fillRect/>
-                      </a:stretch>
-                    </p:blipFill>
-                    <p:spPr>
-                      <a:xfrm>
-                        <a:off x="2667000" y="1371600"/>
-                        <a:ext cx="2100262" cy="928688"/>
-                      </a:xfrm>
-                      <a:prstGeom prst="rect">
-                        <a:avLst/>
-                      </a:prstGeom>
-                    </p:spPr>
-                  </p:pic>
-                </p:oleObj>
-              </mc:Fallback>
-            </mc:AlternateContent>
-          </a:graphicData>
-        </a:graphic>
-      </p:graphicFrame>
-      <p:graphicFrame>
-        <p:nvGraphicFramePr>
-          <p:cNvPr id="7" name="Object 6"/>
-          <p:cNvGraphicFramePr>
-            <a:graphicFrameLocks noChangeAspect="1"/>
-          </p:cNvGraphicFramePr>
-          <p:nvPr>
-            <p:extLst>
-              <p:ext uri="{D42A27DB-BD31-4B8C-83A1-F6EECF244321}">
-                <p14:modId xmlns:p14="http://schemas.microsoft.com/office/powerpoint/2010/main" val="1544979753"/>
-              </p:ext>
-            </p:extLst>
-          </p:nvPr>
-        </p:nvGraphicFramePr>
-        <p:xfrm>
-          <a:off x="1022350" y="2101850"/>
-          <a:ext cx="1882775" cy="1146175"/>
-        </p:xfrm>
-        <a:graphic>
-          <a:graphicData uri="http://schemas.openxmlformats.org/presentationml/2006/ole">
-            <mc:AlternateContent xmlns:mc="http://schemas.openxmlformats.org/markup-compatibility/2006">
-              <mc:Choice xmlns:v="urn:schemas-microsoft-com:vml" Requires="v">
-                <p:oleObj spid="_x0000_s18444" name="Equation" r:id="rId6" imgW="876300" imgH="533400" progId="Equation.3">
-                  <p:embed/>
-                </p:oleObj>
-              </mc:Choice>
-              <mc:Fallback>
-                <p:oleObj name="Equation" r:id="rId6" imgW="876300" imgH="533400" progId="Equation.3">
-                  <p:embed/>
-                  <p:pic>
-                    <p:nvPicPr>
-                      <p:cNvPr id="0" name=""/>
-                      <p:cNvPicPr/>
-                      <p:nvPr/>
-                    </p:nvPicPr>
-                    <p:blipFill>
-                      <a:blip r:embed="rId7"/>
-                      <a:stretch>
-                        <a:fillRect/>
-                      </a:stretch>
-                    </p:blipFill>
-                    <p:spPr>
-                      <a:xfrm>
-                        <a:off x="1022350" y="2101850"/>
-                        <a:ext cx="1882775" cy="1146175"/>
-                      </a:xfrm>
-                      <a:prstGeom prst="rect">
-                        <a:avLst/>
-                      </a:prstGeom>
-                    </p:spPr>
-                  </p:pic>
-                </p:oleObj>
-              </mc:Fallback>
-            </mc:AlternateContent>
-          </a:graphicData>
-        </a:graphic>
-      </p:graphicFrame>
-      <p:graphicFrame>
-        <p:nvGraphicFramePr>
-          <p:cNvPr id="8" name="Object 7"/>
-          <p:cNvGraphicFramePr>
-            <a:graphicFrameLocks noChangeAspect="1"/>
-          </p:cNvGraphicFramePr>
-          <p:nvPr>
-            <p:extLst>
-              <p:ext uri="{D42A27DB-BD31-4B8C-83A1-F6EECF244321}">
-                <p14:modId xmlns:p14="http://schemas.microsoft.com/office/powerpoint/2010/main" val="1518497645"/>
-              </p:ext>
-            </p:extLst>
-          </p:nvPr>
-        </p:nvGraphicFramePr>
-        <p:xfrm>
-          <a:off x="3389313" y="2057400"/>
-          <a:ext cx="1963737" cy="1146175"/>
-        </p:xfrm>
-        <a:graphic>
-          <a:graphicData uri="http://schemas.openxmlformats.org/presentationml/2006/ole">
-            <mc:AlternateContent xmlns:mc="http://schemas.openxmlformats.org/markup-compatibility/2006">
-              <mc:Choice xmlns:v="urn:schemas-microsoft-com:vml" Requires="v">
-                <p:oleObj spid="_x0000_s18445" name="Equation" r:id="rId8" imgW="914400" imgH="533400" progId="Equation.3">
-                  <p:embed/>
-                </p:oleObj>
-              </mc:Choice>
-              <mc:Fallback>
-                <p:oleObj name="Equation" r:id="rId8" imgW="914400" imgH="533400" progId="Equation.3">
-                  <p:embed/>
-                  <p:pic>
-                    <p:nvPicPr>
-                      <p:cNvPr id="0" name=""/>
-                      <p:cNvPicPr/>
-                      <p:nvPr/>
-                    </p:nvPicPr>
-                    <p:blipFill>
-                      <a:blip r:embed="rId9"/>
-                      <a:stretch>
-                        <a:fillRect/>
-                      </a:stretch>
-                    </p:blipFill>
-                    <p:spPr>
-                      <a:xfrm>
-                        <a:off x="3389313" y="2057400"/>
-                        <a:ext cx="1963737" cy="1146175"/>
-                      </a:xfrm>
-                      <a:prstGeom prst="rect">
-                        <a:avLst/>
-                      </a:prstGeom>
-                    </p:spPr>
-                  </p:pic>
-                </p:oleObj>
-              </mc:Fallback>
-            </mc:AlternateContent>
-          </a:graphicData>
-        </a:graphic>
-      </p:graphicFrame>
-      <p:graphicFrame>
-        <p:nvGraphicFramePr>
-          <p:cNvPr id="9" name="Object 8"/>
-          <p:cNvGraphicFramePr>
-            <a:graphicFrameLocks noChangeAspect="1"/>
-          </p:cNvGraphicFramePr>
-          <p:nvPr>
-            <p:extLst>
-              <p:ext uri="{D42A27DB-BD31-4B8C-83A1-F6EECF244321}">
-                <p14:modId xmlns:p14="http://schemas.microsoft.com/office/powerpoint/2010/main" val="1783752850"/>
-              </p:ext>
-            </p:extLst>
-          </p:nvPr>
-        </p:nvGraphicFramePr>
-        <p:xfrm>
-          <a:off x="1371600" y="3124200"/>
-          <a:ext cx="6572251" cy="2401887"/>
-        </p:xfrm>
-        <a:graphic>
-          <a:graphicData uri="http://schemas.openxmlformats.org/presentationml/2006/ole">
-            <mc:AlternateContent xmlns:mc="http://schemas.openxmlformats.org/markup-compatibility/2006">
-              <mc:Choice xmlns:v="urn:schemas-microsoft-com:vml" Requires="v">
-                <p:oleObj spid="_x0000_s18446" name="Equation" r:id="rId10" imgW="3060700" imgH="1117600" progId="Equation.3">
-                  <p:embed/>
-                </p:oleObj>
-              </mc:Choice>
-              <mc:Fallback>
-                <p:oleObj name="Equation" r:id="rId10" imgW="3060700" imgH="1117600" progId="Equation.3">
-                  <p:embed/>
-                  <p:pic>
-                    <p:nvPicPr>
-                      <p:cNvPr id="0" name=""/>
-                      <p:cNvPicPr/>
-                      <p:nvPr/>
-                    </p:nvPicPr>
-                    <p:blipFill>
-                      <a:blip r:embed="rId11"/>
-                      <a:stretch>
-                        <a:fillRect/>
-                      </a:stretch>
-                    </p:blipFill>
-                    <p:spPr>
-                      <a:xfrm>
-                        <a:off x="1371600" y="3124200"/>
-                        <a:ext cx="6572251" cy="2401887"/>
-                      </a:xfrm>
-                      <a:prstGeom prst="rect">
-                        <a:avLst/>
-                      </a:prstGeom>
-                    </p:spPr>
-                  </p:pic>
-                </p:oleObj>
-              </mc:Fallback>
-            </mc:AlternateContent>
-          </a:graphicData>
-        </a:graphic>
-      </p:graphicFrame>
-    </p:spTree>
-    <p:extLst>
-      <p:ext uri="{BB962C8B-B14F-4D97-AF65-F5344CB8AC3E}">
-        <p14:creationId xmlns:p14="http://schemas.microsoft.com/office/powerpoint/2010/main" val="1154691881"/>
-      </p:ext>
-    </p:extLst>
-  </p:cSld>
-  <p:clrMapOvr>
-    <a:masterClrMapping/>
-  </p:clrMapOvr>
-  <p:timing>
-    <p:tnLst>
-      <p:par>
-        <p:cTn xmlns:p14="http://schemas.microsoft.com/office/powerpoint/2010/main" id="1" dur="indefinite" restart="never" nodeType="tmRoot"/>
-      </p:par>
-    </p:tnLst>
-  </p:timing>
-</p:sld>
-</file>
-
-<file path=ppt/slides/slide15.xml><?xml version="1.0" encoding="utf-8"?>
-<p:sld xmlns:a="http://schemas.openxmlformats.org/drawingml/2006/main" xmlns:r="http://schemas.openxmlformats.org/officeDocument/2006/relationships" xmlns:p="http://schemas.openxmlformats.org/presentationml/2006/main">
-  <p:cSld>
-    <p:spTree>
-      <p:nvGrpSpPr>
-        <p:cNvPr id="1" name=""/>
-        <p:cNvGrpSpPr/>
-        <p:nvPr/>
-      </p:nvGrpSpPr>
-      <p:grpSpPr>
-        <a:xfrm>
-          <a:off x="0" y="0"/>
-          <a:ext cx="0" cy="0"/>
-          <a:chOff x="0" y="0"/>
-          <a:chExt cx="0" cy="0"/>
-        </a:xfrm>
-      </p:grpSpPr>
-      <p:sp>
-        <p:nvSpPr>
-          <p:cNvPr id="2" name="Title 1"/>
-          <p:cNvSpPr>
-            <a:spLocks noGrp="1"/>
-          </p:cNvSpPr>
-          <p:nvPr>
-            <p:ph type="ctrTitle"/>
-          </p:nvPr>
-        </p:nvSpPr>
-        <p:spPr>
-          <a:xfrm>
-            <a:off x="381000" y="33077"/>
-            <a:ext cx="8382000" cy="762000"/>
-          </a:xfrm>
-        </p:spPr>
-        <p:txBody>
-          <a:bodyPr>
-            <a:normAutofit/>
-          </a:bodyPr>
-          <a:lstStyle/>
-          <a:p>
-            <a:r>
-              <a:rPr lang="en-US" sz="3200" dirty="0" smtClean="0">
-                <a:solidFill>
-                  <a:schemeClr val="accent2">
-                    <a:lumMod val="75000"/>
-                  </a:schemeClr>
-                </a:solidFill>
-              </a:rPr>
-              <a:t>Multivariate Normal Distribution</a:t>
-            </a:r>
-            <a:endParaRPr lang="en-US" sz="3200" dirty="0">
-              <a:solidFill>
-                <a:schemeClr val="accent2">
-                  <a:lumMod val="75000"/>
-                </a:schemeClr>
-              </a:solidFill>
-            </a:endParaRPr>
-          </a:p>
-        </p:txBody>
-      </p:sp>
-      <p:sp>
-        <p:nvSpPr>
-          <p:cNvPr id="4" name="Footer Placeholder 3"/>
-          <p:cNvSpPr>
-            <a:spLocks noGrp="1"/>
-          </p:cNvSpPr>
-          <p:nvPr>
-            <p:ph type="ftr" sz="quarter" idx="11"/>
-          </p:nvPr>
-        </p:nvSpPr>
-        <p:spPr/>
-        <p:txBody>
-          <a:bodyPr/>
-          <a:lstStyle/>
-          <a:p>
-            <a:r>
-              <a:rPr lang="en-US" dirty="0" smtClean="0">
-                <a:solidFill>
-                  <a:schemeClr val="accent1"/>
-                </a:solidFill>
-              </a:rPr>
-              <a:t>STT 465, MSU, Fall, 2015</a:t>
-            </a:r>
-            <a:endParaRPr lang="en-US" dirty="0">
-              <a:solidFill>
-                <a:schemeClr val="accent1"/>
-              </a:solidFill>
-            </a:endParaRPr>
-          </a:p>
-        </p:txBody>
-      </p:sp>
-      <p:sp>
-        <p:nvSpPr>
-          <p:cNvPr id="6" name="TextBox 5"/>
-          <p:cNvSpPr txBox="1"/>
-          <p:nvPr/>
-        </p:nvSpPr>
-        <p:spPr>
-          <a:xfrm>
-            <a:off x="304800" y="762000"/>
-            <a:ext cx="8229600" cy="5632312"/>
-          </a:xfrm>
-          <a:prstGeom prst="rect">
-            <a:avLst/>
-          </a:prstGeom>
-          <a:noFill/>
-          <a:ln>
-            <a:solidFill>
-              <a:srgbClr val="800000"/>
-            </a:solidFill>
-            <a:prstDash val="sysDash"/>
-          </a:ln>
-        </p:spPr>
-        <p:txBody>
-          <a:bodyPr wrap="square" rtlCol="0">
-            <a:spAutoFit/>
-          </a:bodyPr>
-          <a:lstStyle/>
-          <a:p>
-            <a:endParaRPr lang="en-US" dirty="0" smtClean="0">
-              <a:solidFill>
-                <a:schemeClr val="accent1">
-                  <a:lumMod val="75000"/>
-                </a:schemeClr>
-              </a:solidFill>
-            </a:endParaRPr>
-          </a:p>
-          <a:p>
-            <a:endParaRPr lang="en-US" dirty="0">
-              <a:solidFill>
-                <a:schemeClr val="accent1">
-                  <a:lumMod val="75000"/>
-                </a:schemeClr>
-              </a:solidFill>
-            </a:endParaRPr>
-          </a:p>
-          <a:p>
-            <a:endParaRPr lang="en-US" dirty="0" smtClean="0">
-              <a:solidFill>
-                <a:schemeClr val="accent1">
-                  <a:lumMod val="75000"/>
-                </a:schemeClr>
-              </a:solidFill>
-            </a:endParaRPr>
-          </a:p>
-          <a:p>
-            <a:endParaRPr lang="en-US" dirty="0">
-              <a:solidFill>
-                <a:schemeClr val="accent1">
-                  <a:lumMod val="75000"/>
-                </a:schemeClr>
-              </a:solidFill>
-            </a:endParaRPr>
-          </a:p>
-          <a:p>
-            <a:endParaRPr lang="en-US" dirty="0" smtClean="0">
-              <a:solidFill>
-                <a:schemeClr val="accent1">
-                  <a:lumMod val="75000"/>
-                </a:schemeClr>
-              </a:solidFill>
-            </a:endParaRPr>
-          </a:p>
-          <a:p>
-            <a:endParaRPr lang="en-US" dirty="0">
-              <a:solidFill>
-                <a:schemeClr val="accent1">
-                  <a:lumMod val="75000"/>
-                </a:schemeClr>
-              </a:solidFill>
-            </a:endParaRPr>
-          </a:p>
-          <a:p>
-            <a:endParaRPr lang="en-US" dirty="0" smtClean="0">
-              <a:solidFill>
-                <a:schemeClr val="accent1">
-                  <a:lumMod val="75000"/>
-                </a:schemeClr>
-              </a:solidFill>
-            </a:endParaRPr>
-          </a:p>
-          <a:p>
-            <a:endParaRPr lang="en-US" dirty="0">
-              <a:solidFill>
-                <a:schemeClr val="accent1">
-                  <a:lumMod val="75000"/>
-                </a:schemeClr>
-              </a:solidFill>
-            </a:endParaRPr>
-          </a:p>
-          <a:p>
-            <a:endParaRPr lang="en-US" dirty="0" smtClean="0">
-              <a:solidFill>
-                <a:schemeClr val="accent1">
-                  <a:lumMod val="75000"/>
-                </a:schemeClr>
-              </a:solidFill>
-            </a:endParaRPr>
-          </a:p>
-          <a:p>
-            <a:endParaRPr lang="en-US" dirty="0">
-              <a:solidFill>
-                <a:schemeClr val="accent1">
-                  <a:lumMod val="75000"/>
-                </a:schemeClr>
-              </a:solidFill>
-            </a:endParaRPr>
-          </a:p>
-          <a:p>
-            <a:endParaRPr lang="en-US" dirty="0" smtClean="0">
-              <a:solidFill>
-                <a:schemeClr val="accent1">
-                  <a:lumMod val="75000"/>
-                </a:schemeClr>
-              </a:solidFill>
-            </a:endParaRPr>
-          </a:p>
-          <a:p>
-            <a:endParaRPr lang="en-US" dirty="0">
-              <a:solidFill>
-                <a:schemeClr val="accent1">
-                  <a:lumMod val="75000"/>
-                </a:schemeClr>
-              </a:solidFill>
-            </a:endParaRPr>
-          </a:p>
-          <a:p>
-            <a:endParaRPr lang="en-US" dirty="0" smtClean="0">
-              <a:solidFill>
-                <a:schemeClr val="accent1">
-                  <a:lumMod val="75000"/>
-                </a:schemeClr>
-              </a:solidFill>
-            </a:endParaRPr>
-          </a:p>
-          <a:p>
-            <a:endParaRPr lang="en-US" dirty="0">
-              <a:solidFill>
-                <a:schemeClr val="accent1">
-                  <a:lumMod val="75000"/>
-                </a:schemeClr>
-              </a:solidFill>
-            </a:endParaRPr>
-          </a:p>
-          <a:p>
-            <a:endParaRPr lang="en-US" dirty="0" smtClean="0">
-              <a:solidFill>
-                <a:schemeClr val="accent1">
-                  <a:lumMod val="75000"/>
-                </a:schemeClr>
-              </a:solidFill>
-            </a:endParaRPr>
-          </a:p>
-          <a:p>
-            <a:endParaRPr lang="en-US" dirty="0">
-              <a:solidFill>
-                <a:schemeClr val="accent1">
-                  <a:lumMod val="75000"/>
-                </a:schemeClr>
-              </a:solidFill>
-            </a:endParaRPr>
-          </a:p>
-          <a:p>
-            <a:endParaRPr lang="en-US" dirty="0" smtClean="0">
-              <a:solidFill>
-                <a:schemeClr val="accent1">
-                  <a:lumMod val="75000"/>
-                </a:schemeClr>
-              </a:solidFill>
-            </a:endParaRPr>
-          </a:p>
-          <a:p>
-            <a:endParaRPr lang="en-US" dirty="0">
-              <a:solidFill>
-                <a:schemeClr val="accent1">
-                  <a:lumMod val="75000"/>
-                </a:schemeClr>
-              </a:solidFill>
-            </a:endParaRPr>
-          </a:p>
-          <a:p>
-            <a:endParaRPr lang="en-US" dirty="0" smtClean="0">
-              <a:solidFill>
-                <a:schemeClr val="accent1">
-                  <a:lumMod val="75000"/>
-                </a:schemeClr>
-              </a:solidFill>
-            </a:endParaRPr>
-          </a:p>
-          <a:p>
-            <a:endParaRPr lang="en-US" dirty="0" smtClean="0">
-              <a:solidFill>
-                <a:schemeClr val="accent1">
-                  <a:lumMod val="75000"/>
-                </a:schemeClr>
-              </a:solidFill>
-            </a:endParaRPr>
-          </a:p>
-        </p:txBody>
-      </p:sp>
-      <p:graphicFrame>
-        <p:nvGraphicFramePr>
-          <p:cNvPr id="5" name="Object 4"/>
-          <p:cNvGraphicFramePr>
-            <a:graphicFrameLocks noChangeAspect="1"/>
-          </p:cNvGraphicFramePr>
-          <p:nvPr>
-            <p:extLst>
-              <p:ext uri="{D42A27DB-BD31-4B8C-83A1-F6EECF244321}">
-                <p14:modId xmlns:p14="http://schemas.microsoft.com/office/powerpoint/2010/main" val="2301433316"/>
-              </p:ext>
-            </p:extLst>
-          </p:nvPr>
-        </p:nvGraphicFramePr>
-        <p:xfrm>
-          <a:off x="1371600" y="2438400"/>
-          <a:ext cx="6573837" cy="1338262"/>
-        </p:xfrm>
-        <a:graphic>
-          <a:graphicData uri="http://schemas.openxmlformats.org/presentationml/2006/ole">
-            <mc:AlternateContent xmlns:mc="http://schemas.openxmlformats.org/markup-compatibility/2006">
-              <mc:Choice xmlns:v="urn:schemas-microsoft-com:vml" Requires="v">
-                <p:oleObj spid="_x0000_s19460" name="Equation" r:id="rId4" imgW="3060700" imgH="622300" progId="Equation.3">
-                  <p:embed/>
-                </p:oleObj>
-              </mc:Choice>
-              <mc:Fallback>
-                <p:oleObj name="Equation" r:id="rId4" imgW="3060700" imgH="622300" progId="Equation.3">
-                  <p:embed/>
-                  <p:pic>
-                    <p:nvPicPr>
-                      <p:cNvPr id="0" name=""/>
-                      <p:cNvPicPr/>
-                      <p:nvPr/>
-                    </p:nvPicPr>
-                    <p:blipFill>
-                      <a:blip r:embed="rId5"/>
-                      <a:stretch>
-                        <a:fillRect/>
-                      </a:stretch>
-                    </p:blipFill>
-                    <p:spPr>
-                      <a:xfrm>
-                        <a:off x="1371600" y="2438400"/>
-                        <a:ext cx="6573837" cy="1338262"/>
-                      </a:xfrm>
-                      <a:prstGeom prst="rect">
-                        <a:avLst/>
-                      </a:prstGeom>
-                    </p:spPr>
-                  </p:pic>
-                </p:oleObj>
-              </mc:Fallback>
-            </mc:AlternateContent>
-          </a:graphicData>
-        </a:graphic>
-      </p:graphicFrame>
-    </p:spTree>
-    <p:extLst>
-      <p:ext uri="{BB962C8B-B14F-4D97-AF65-F5344CB8AC3E}">
-        <p14:creationId xmlns:p14="http://schemas.microsoft.com/office/powerpoint/2010/main" val="1445004961"/>
-      </p:ext>
-    </p:extLst>
-  </p:cSld>
-  <p:clrMapOvr>
-    <a:masterClrMapping/>
-  </p:clrMapOvr>
-  <p:timing>
-    <p:tnLst>
-      <p:par>
-        <p:cTn xmlns:p14="http://schemas.microsoft.com/office/powerpoint/2010/main" id="1" dur="indefinite" restart="never" nodeType="tmRoot"/>
-      </p:par>
-    </p:tnLst>
-  </p:timing>
-</p:sld>
-</file>
-
-<file path=ppt/slides/slide16.xml><?xml version="1.0" encoding="utf-8"?>
-<p:sld xmlns:a="http://schemas.openxmlformats.org/drawingml/2006/main" xmlns:r="http://schemas.openxmlformats.org/officeDocument/2006/relationships" xmlns:p="http://schemas.openxmlformats.org/presentationml/2006/main">
-  <p:cSld>
-    <p:spTree>
-      <p:nvGrpSpPr>
-        <p:cNvPr id="1" name=""/>
-        <p:cNvGrpSpPr/>
-        <p:nvPr/>
-      </p:nvGrpSpPr>
-      <p:grpSpPr>
-        <a:xfrm>
-          <a:off x="0" y="0"/>
-          <a:ext cx="0" cy="0"/>
-          <a:chOff x="0" y="0"/>
-          <a:chExt cx="0" cy="0"/>
-        </a:xfrm>
-      </p:grpSpPr>
-      <p:sp>
-        <p:nvSpPr>
-          <p:cNvPr id="2" name="Title 1"/>
-          <p:cNvSpPr>
-            <a:spLocks noGrp="1"/>
-          </p:cNvSpPr>
-          <p:nvPr>
-            <p:ph type="ctrTitle"/>
-          </p:nvPr>
-        </p:nvSpPr>
-        <p:spPr>
-          <a:xfrm>
-            <a:off x="381000" y="33077"/>
-            <a:ext cx="8382000" cy="762000"/>
-          </a:xfrm>
-        </p:spPr>
-        <p:txBody>
-          <a:bodyPr>
-            <a:normAutofit/>
-          </a:bodyPr>
-          <a:lstStyle/>
-          <a:p>
-            <a:r>
-              <a:rPr lang="en-US" sz="3200" dirty="0" smtClean="0">
-                <a:solidFill>
-                  <a:schemeClr val="accent2">
-                    <a:lumMod val="75000"/>
-                  </a:schemeClr>
-                </a:solidFill>
-              </a:rPr>
-              <a:t>Multivariate Normal Distribution</a:t>
-            </a:r>
-            <a:endParaRPr lang="en-US" sz="3200" dirty="0">
-              <a:solidFill>
-                <a:schemeClr val="accent2">
-                  <a:lumMod val="75000"/>
-                </a:schemeClr>
-              </a:solidFill>
-            </a:endParaRPr>
-          </a:p>
-        </p:txBody>
-      </p:sp>
-      <p:sp>
-        <p:nvSpPr>
-          <p:cNvPr id="4" name="Footer Placeholder 3"/>
-          <p:cNvSpPr>
-            <a:spLocks noGrp="1"/>
-          </p:cNvSpPr>
-          <p:nvPr>
-            <p:ph type="ftr" sz="quarter" idx="11"/>
-          </p:nvPr>
-        </p:nvSpPr>
-        <p:spPr/>
-        <p:txBody>
-          <a:bodyPr/>
-          <a:lstStyle/>
-          <a:p>
-            <a:r>
-              <a:rPr lang="en-US" dirty="0" smtClean="0">
-                <a:solidFill>
-                  <a:schemeClr val="accent1"/>
-                </a:solidFill>
-              </a:rPr>
-              <a:t>STT 465, MSU, Fall, 2015</a:t>
-            </a:r>
-            <a:endParaRPr lang="en-US" dirty="0">
-              <a:solidFill>
-                <a:schemeClr val="accent1"/>
-              </a:solidFill>
-            </a:endParaRPr>
-          </a:p>
-        </p:txBody>
-      </p:sp>
-      <p:sp>
-        <p:nvSpPr>
-          <p:cNvPr id="6" name="TextBox 5"/>
-          <p:cNvSpPr txBox="1"/>
-          <p:nvPr/>
-        </p:nvSpPr>
-        <p:spPr>
-          <a:xfrm>
-            <a:off x="304800" y="762000"/>
-            <a:ext cx="8229600" cy="5632312"/>
-          </a:xfrm>
-          <a:prstGeom prst="rect">
-            <a:avLst/>
-          </a:prstGeom>
-          <a:noFill/>
-          <a:ln>
-            <a:solidFill>
-              <a:srgbClr val="800000"/>
-            </a:solidFill>
-            <a:prstDash val="sysDash"/>
-          </a:ln>
-        </p:spPr>
-        <p:txBody>
-          <a:bodyPr wrap="square" rtlCol="0">
-            <a:spAutoFit/>
-          </a:bodyPr>
-          <a:lstStyle/>
-          <a:p>
-            <a:endParaRPr lang="en-US" dirty="0" smtClean="0">
-              <a:solidFill>
-                <a:schemeClr val="accent1">
-                  <a:lumMod val="75000"/>
-                </a:schemeClr>
-              </a:solidFill>
-            </a:endParaRPr>
-          </a:p>
-          <a:p>
-            <a:endParaRPr lang="en-US" dirty="0">
-              <a:solidFill>
-                <a:schemeClr val="accent1">
-                  <a:lumMod val="75000"/>
-                </a:schemeClr>
-              </a:solidFill>
-            </a:endParaRPr>
-          </a:p>
-          <a:p>
-            <a:endParaRPr lang="en-US" dirty="0" smtClean="0">
-              <a:solidFill>
-                <a:schemeClr val="accent1">
-                  <a:lumMod val="75000"/>
-                </a:schemeClr>
-              </a:solidFill>
-            </a:endParaRPr>
-          </a:p>
-          <a:p>
-            <a:endParaRPr lang="en-US" dirty="0">
-              <a:solidFill>
-                <a:schemeClr val="accent1">
-                  <a:lumMod val="75000"/>
-                </a:schemeClr>
-              </a:solidFill>
-            </a:endParaRPr>
-          </a:p>
-          <a:p>
-            <a:endParaRPr lang="en-US" dirty="0" smtClean="0">
-              <a:solidFill>
-                <a:schemeClr val="accent1">
-                  <a:lumMod val="75000"/>
-                </a:schemeClr>
-              </a:solidFill>
-            </a:endParaRPr>
-          </a:p>
-          <a:p>
-            <a:endParaRPr lang="en-US" dirty="0">
-              <a:solidFill>
-                <a:schemeClr val="accent1">
-                  <a:lumMod val="75000"/>
-                </a:schemeClr>
-              </a:solidFill>
-            </a:endParaRPr>
-          </a:p>
-          <a:p>
-            <a:endParaRPr lang="en-US" dirty="0" smtClean="0">
-              <a:solidFill>
-                <a:schemeClr val="accent1">
-                  <a:lumMod val="75000"/>
-                </a:schemeClr>
-              </a:solidFill>
-            </a:endParaRPr>
-          </a:p>
-          <a:p>
-            <a:endParaRPr lang="en-US" dirty="0">
-              <a:solidFill>
-                <a:schemeClr val="accent1">
-                  <a:lumMod val="75000"/>
-                </a:schemeClr>
-              </a:solidFill>
-            </a:endParaRPr>
-          </a:p>
-          <a:p>
-            <a:endParaRPr lang="en-US" dirty="0" smtClean="0">
-              <a:solidFill>
-                <a:schemeClr val="accent1">
-                  <a:lumMod val="75000"/>
-                </a:schemeClr>
-              </a:solidFill>
-            </a:endParaRPr>
-          </a:p>
-          <a:p>
-            <a:endParaRPr lang="en-US" dirty="0">
-              <a:solidFill>
-                <a:schemeClr val="accent1">
-                  <a:lumMod val="75000"/>
-                </a:schemeClr>
-              </a:solidFill>
-            </a:endParaRPr>
-          </a:p>
-          <a:p>
-            <a:endParaRPr lang="en-US" dirty="0" smtClean="0">
-              <a:solidFill>
-                <a:schemeClr val="accent1">
-                  <a:lumMod val="75000"/>
-                </a:schemeClr>
-              </a:solidFill>
-            </a:endParaRPr>
-          </a:p>
-          <a:p>
-            <a:endParaRPr lang="en-US" dirty="0">
-              <a:solidFill>
-                <a:schemeClr val="accent1">
-                  <a:lumMod val="75000"/>
-                </a:schemeClr>
-              </a:solidFill>
-            </a:endParaRPr>
-          </a:p>
-          <a:p>
-            <a:endParaRPr lang="en-US" dirty="0" smtClean="0">
-              <a:solidFill>
-                <a:schemeClr val="accent1">
-                  <a:lumMod val="75000"/>
-                </a:schemeClr>
-              </a:solidFill>
-            </a:endParaRPr>
-          </a:p>
-          <a:p>
-            <a:endParaRPr lang="en-US" dirty="0">
-              <a:solidFill>
-                <a:schemeClr val="accent1">
-                  <a:lumMod val="75000"/>
-                </a:schemeClr>
-              </a:solidFill>
-            </a:endParaRPr>
-          </a:p>
-          <a:p>
-            <a:endParaRPr lang="en-US" dirty="0" smtClean="0">
-              <a:solidFill>
-                <a:schemeClr val="accent1">
-                  <a:lumMod val="75000"/>
-                </a:schemeClr>
-              </a:solidFill>
-            </a:endParaRPr>
-          </a:p>
-          <a:p>
-            <a:endParaRPr lang="en-US" dirty="0">
-              <a:solidFill>
-                <a:schemeClr val="accent1">
-                  <a:lumMod val="75000"/>
-                </a:schemeClr>
-              </a:solidFill>
-            </a:endParaRPr>
-          </a:p>
-          <a:p>
-            <a:endParaRPr lang="en-US" dirty="0" smtClean="0">
-              <a:solidFill>
-                <a:schemeClr val="accent1">
-                  <a:lumMod val="75000"/>
-                </a:schemeClr>
-              </a:solidFill>
-            </a:endParaRPr>
-          </a:p>
-          <a:p>
-            <a:endParaRPr lang="en-US" dirty="0">
-              <a:solidFill>
-                <a:schemeClr val="accent1">
-                  <a:lumMod val="75000"/>
-                </a:schemeClr>
-              </a:solidFill>
-            </a:endParaRPr>
-          </a:p>
-          <a:p>
-            <a:endParaRPr lang="en-US" dirty="0" smtClean="0">
-              <a:solidFill>
-                <a:schemeClr val="accent1">
-                  <a:lumMod val="75000"/>
-                </a:schemeClr>
-              </a:solidFill>
-            </a:endParaRPr>
-          </a:p>
-          <a:p>
-            <a:endParaRPr lang="en-US" dirty="0" smtClean="0">
-              <a:solidFill>
-                <a:schemeClr val="accent1">
-                  <a:lumMod val="75000"/>
-                </a:schemeClr>
-              </a:solidFill>
-            </a:endParaRPr>
-          </a:p>
-        </p:txBody>
-      </p:sp>
-      <p:graphicFrame>
-        <p:nvGraphicFramePr>
-          <p:cNvPr id="5" name="Object 4"/>
-          <p:cNvGraphicFramePr>
-            <a:graphicFrameLocks noChangeAspect="1"/>
-          </p:cNvGraphicFramePr>
-          <p:nvPr>
-            <p:extLst>
-              <p:ext uri="{D42A27DB-BD31-4B8C-83A1-F6EECF244321}">
-                <p14:modId xmlns:p14="http://schemas.microsoft.com/office/powerpoint/2010/main" val="827461164"/>
-              </p:ext>
-            </p:extLst>
-          </p:nvPr>
-        </p:nvGraphicFramePr>
-        <p:xfrm>
-          <a:off x="1295400" y="990600"/>
-          <a:ext cx="5864225" cy="1638300"/>
-        </p:xfrm>
-        <a:graphic>
-          <a:graphicData uri="http://schemas.openxmlformats.org/presentationml/2006/ole">
-            <mc:AlternateContent xmlns:mc="http://schemas.openxmlformats.org/markup-compatibility/2006">
-              <mc:Choice xmlns:v="urn:schemas-microsoft-com:vml" Requires="v">
-                <p:oleObj spid="_x0000_s20485" name="Equation" r:id="rId4" imgW="2730500" imgH="762000" progId="Equation.3">
-                  <p:embed/>
-                </p:oleObj>
-              </mc:Choice>
-              <mc:Fallback>
-                <p:oleObj name="Equation" r:id="rId4" imgW="2730500" imgH="762000" progId="Equation.3">
-                  <p:embed/>
-                  <p:pic>
-                    <p:nvPicPr>
-                      <p:cNvPr id="0" name=""/>
-                      <p:cNvPicPr/>
-                      <p:nvPr/>
-                    </p:nvPicPr>
-                    <p:blipFill>
-                      <a:blip r:embed="rId5"/>
-                      <a:stretch>
-                        <a:fillRect/>
-                      </a:stretch>
-                    </p:blipFill>
-                    <p:spPr>
-                      <a:xfrm>
-                        <a:off x="1295400" y="990600"/>
-                        <a:ext cx="5864225" cy="1638300"/>
-                      </a:xfrm>
-                      <a:prstGeom prst="rect">
-                        <a:avLst/>
-                      </a:prstGeom>
-                    </p:spPr>
-                  </p:pic>
-                </p:oleObj>
-              </mc:Fallback>
-            </mc:AlternateContent>
-          </a:graphicData>
-        </a:graphic>
-      </p:graphicFrame>
-      <p:sp>
-        <p:nvSpPr>
-          <p:cNvPr id="3" name="TextBox 2"/>
-          <p:cNvSpPr txBox="1"/>
-          <p:nvPr/>
-        </p:nvSpPr>
-        <p:spPr>
-          <a:xfrm>
-            <a:off x="914400" y="3056453"/>
-            <a:ext cx="7162800" cy="2277547"/>
-          </a:xfrm>
-          <a:prstGeom prst="rect">
-            <a:avLst/>
-          </a:prstGeom>
-          <a:noFill/>
-        </p:spPr>
-        <p:txBody>
-          <a:bodyPr wrap="square" rtlCol="0">
-            <a:spAutoFit/>
-          </a:bodyPr>
-          <a:lstStyle/>
-          <a:p>
-            <a:pPr algn="ctr"/>
-            <a:r>
-              <a:rPr lang="en-US" sz="2400" b="1" dirty="0" smtClean="0">
-                <a:solidFill>
-                  <a:srgbClr val="800000"/>
-                </a:solidFill>
-              </a:rPr>
-              <a:t>Important Results</a:t>
-            </a:r>
-          </a:p>
-          <a:p>
-            <a:endParaRPr lang="en-US" dirty="0" smtClean="0"/>
-          </a:p>
-          <a:p>
-            <a:pPr marL="285750" indent="-285750">
-              <a:buFontTx/>
-              <a:buChar char="-"/>
-            </a:pPr>
-            <a:r>
-              <a:rPr lang="en-US" sz="2000" dirty="0" smtClean="0">
-                <a:solidFill>
-                  <a:schemeClr val="tx2"/>
-                </a:solidFill>
-              </a:rPr>
-              <a:t>All marginal are normal</a:t>
-            </a:r>
-          </a:p>
-          <a:p>
-            <a:pPr marL="285750" indent="-285750">
-              <a:buFontTx/>
-              <a:buChar char="-"/>
-            </a:pPr>
-            <a:r>
-              <a:rPr lang="en-US" sz="2000" dirty="0" smtClean="0">
-                <a:solidFill>
-                  <a:schemeClr val="tx2"/>
-                </a:solidFill>
-              </a:rPr>
-              <a:t>All conditional distributions are also normal</a:t>
-            </a:r>
-          </a:p>
-          <a:p>
-            <a:pPr marL="285750" indent="-285750">
-              <a:buFontTx/>
-              <a:buChar char="-"/>
-            </a:pPr>
-            <a:r>
-              <a:rPr lang="en-US" sz="2000" dirty="0" smtClean="0">
-                <a:solidFill>
-                  <a:schemeClr val="tx2"/>
-                </a:solidFill>
-              </a:rPr>
-              <a:t>The normal distribution is closed under linear transformations (i.e., linear transformations of MVN random variables are also MVN).</a:t>
-            </a:r>
-            <a:endParaRPr lang="en-US" sz="2000" dirty="0">
-              <a:solidFill>
-                <a:schemeClr val="tx2"/>
-              </a:solidFill>
-            </a:endParaRPr>
-          </a:p>
-        </p:txBody>
-      </p:sp>
-    </p:spTree>
-    <p:extLst>
-      <p:ext uri="{BB962C8B-B14F-4D97-AF65-F5344CB8AC3E}">
-        <p14:creationId xmlns:p14="http://schemas.microsoft.com/office/powerpoint/2010/main" val="665788483"/>
-      </p:ext>
-    </p:extLst>
-  </p:cSld>
-  <p:clrMapOvr>
-    <a:masterClrMapping/>
-  </p:clrMapOvr>
-  <p:timing>
-    <p:tnLst>
-      <p:par>
-        <p:cTn xmlns:p14="http://schemas.microsoft.com/office/powerpoint/2010/main" id="1" dur="indefinite" restart="never" nodeType="tmRoot"/>
-      </p:par>
-    </p:tnLst>
-  </p:timing>
-</p:sld>
-</file>
-
-<file path=ppt/slides/slide17.xml><?xml version="1.0" encoding="utf-8"?>
-<p:sld xmlns:a="http://schemas.openxmlformats.org/drawingml/2006/main" xmlns:r="http://schemas.openxmlformats.org/officeDocument/2006/relationships" xmlns:p="http://schemas.openxmlformats.org/presentationml/2006/main">
-  <p:cSld>
-    <p:spTree>
-      <p:nvGrpSpPr>
-        <p:cNvPr id="1" name=""/>
-        <p:cNvGrpSpPr/>
-        <p:nvPr/>
-      </p:nvGrpSpPr>
-      <p:grpSpPr>
-        <a:xfrm>
-          <a:off x="0" y="0"/>
-          <a:ext cx="0" cy="0"/>
-          <a:chOff x="0" y="0"/>
-          <a:chExt cx="0" cy="0"/>
-        </a:xfrm>
-      </p:grpSpPr>
-      <p:sp>
-        <p:nvSpPr>
-          <p:cNvPr id="2" name="Title 1"/>
-          <p:cNvSpPr>
-            <a:spLocks noGrp="1"/>
-          </p:cNvSpPr>
-          <p:nvPr>
-            <p:ph type="ctrTitle"/>
-          </p:nvPr>
-        </p:nvSpPr>
-        <p:spPr>
-          <a:xfrm>
-            <a:off x="381000" y="33077"/>
-            <a:ext cx="8382000" cy="762000"/>
-          </a:xfrm>
-        </p:spPr>
-        <p:txBody>
-          <a:bodyPr>
-            <a:normAutofit/>
-          </a:bodyPr>
-          <a:lstStyle/>
-          <a:p>
-            <a:r>
-              <a:rPr lang="en-US" sz="3200" dirty="0" smtClean="0">
-                <a:solidFill>
-                  <a:schemeClr val="accent2">
-                    <a:lumMod val="75000"/>
-                  </a:schemeClr>
-                </a:solidFill>
-              </a:rPr>
-              <a:t>Multivariate Normal Distribution</a:t>
-            </a:r>
-            <a:endParaRPr lang="en-US" sz="3200" dirty="0">
-              <a:solidFill>
-                <a:schemeClr val="accent2">
-                  <a:lumMod val="75000"/>
-                </a:schemeClr>
-              </a:solidFill>
-            </a:endParaRPr>
-          </a:p>
-        </p:txBody>
-      </p:sp>
-      <p:sp>
-        <p:nvSpPr>
-          <p:cNvPr id="4" name="Footer Placeholder 3"/>
-          <p:cNvSpPr>
-            <a:spLocks noGrp="1"/>
-          </p:cNvSpPr>
-          <p:nvPr>
-            <p:ph type="ftr" sz="quarter" idx="11"/>
-          </p:nvPr>
-        </p:nvSpPr>
-        <p:spPr/>
-        <p:txBody>
-          <a:bodyPr/>
-          <a:lstStyle/>
-          <a:p>
-            <a:r>
-              <a:rPr lang="en-US" dirty="0" smtClean="0">
-                <a:solidFill>
-                  <a:schemeClr val="accent1"/>
-                </a:solidFill>
-              </a:rPr>
-              <a:t>STT 465, MSU, Fall, 2015</a:t>
-            </a:r>
-            <a:endParaRPr lang="en-US" dirty="0">
-              <a:solidFill>
-                <a:schemeClr val="accent1"/>
-              </a:solidFill>
-            </a:endParaRPr>
-          </a:p>
-        </p:txBody>
-      </p:sp>
-      <p:sp>
-        <p:nvSpPr>
-          <p:cNvPr id="6" name="TextBox 5"/>
-          <p:cNvSpPr txBox="1"/>
-          <p:nvPr/>
-        </p:nvSpPr>
-        <p:spPr>
-          <a:xfrm>
-            <a:off x="304800" y="762000"/>
-            <a:ext cx="8686800" cy="5632312"/>
-          </a:xfrm>
-          <a:prstGeom prst="rect">
-            <a:avLst/>
-          </a:prstGeom>
-          <a:noFill/>
-          <a:ln>
-            <a:solidFill>
-              <a:srgbClr val="800000"/>
-            </a:solidFill>
-            <a:prstDash val="sysDash"/>
-          </a:ln>
-        </p:spPr>
-        <p:txBody>
-          <a:bodyPr wrap="square" rtlCol="0">
-            <a:spAutoFit/>
-          </a:bodyPr>
-          <a:lstStyle/>
-          <a:p>
-            <a:endParaRPr lang="en-US" dirty="0" smtClean="0">
-              <a:solidFill>
-                <a:schemeClr val="accent1">
-                  <a:lumMod val="75000"/>
-                </a:schemeClr>
-              </a:solidFill>
-            </a:endParaRPr>
-          </a:p>
-          <a:p>
-            <a:endParaRPr lang="en-US" dirty="0">
-              <a:solidFill>
-                <a:schemeClr val="accent1">
-                  <a:lumMod val="75000"/>
-                </a:schemeClr>
-              </a:solidFill>
-            </a:endParaRPr>
-          </a:p>
-          <a:p>
-            <a:endParaRPr lang="en-US" dirty="0" smtClean="0">
-              <a:solidFill>
-                <a:schemeClr val="accent1">
-                  <a:lumMod val="75000"/>
-                </a:schemeClr>
-              </a:solidFill>
-            </a:endParaRPr>
-          </a:p>
-          <a:p>
-            <a:endParaRPr lang="en-US" dirty="0">
-              <a:solidFill>
-                <a:schemeClr val="accent1">
-                  <a:lumMod val="75000"/>
-                </a:schemeClr>
-              </a:solidFill>
-            </a:endParaRPr>
-          </a:p>
-          <a:p>
-            <a:endParaRPr lang="en-US" dirty="0" smtClean="0">
-              <a:solidFill>
-                <a:schemeClr val="accent1">
-                  <a:lumMod val="75000"/>
-                </a:schemeClr>
-              </a:solidFill>
-            </a:endParaRPr>
-          </a:p>
-          <a:p>
-            <a:endParaRPr lang="en-US" dirty="0">
-              <a:solidFill>
-                <a:schemeClr val="accent1">
-                  <a:lumMod val="75000"/>
-                </a:schemeClr>
-              </a:solidFill>
-            </a:endParaRPr>
-          </a:p>
-          <a:p>
-            <a:endParaRPr lang="en-US" dirty="0" smtClean="0">
-              <a:solidFill>
-                <a:schemeClr val="accent1">
-                  <a:lumMod val="75000"/>
-                </a:schemeClr>
-              </a:solidFill>
-            </a:endParaRPr>
-          </a:p>
-          <a:p>
-            <a:endParaRPr lang="en-US" dirty="0">
-              <a:solidFill>
-                <a:schemeClr val="accent1">
-                  <a:lumMod val="75000"/>
-                </a:schemeClr>
-              </a:solidFill>
-            </a:endParaRPr>
-          </a:p>
-          <a:p>
-            <a:endParaRPr lang="en-US" dirty="0" smtClean="0">
-              <a:solidFill>
-                <a:schemeClr val="accent1">
-                  <a:lumMod val="75000"/>
-                </a:schemeClr>
-              </a:solidFill>
-            </a:endParaRPr>
-          </a:p>
-          <a:p>
-            <a:endParaRPr lang="en-US" dirty="0">
-              <a:solidFill>
-                <a:schemeClr val="accent1">
-                  <a:lumMod val="75000"/>
-                </a:schemeClr>
-              </a:solidFill>
-            </a:endParaRPr>
-          </a:p>
-          <a:p>
-            <a:endParaRPr lang="en-US" dirty="0" smtClean="0">
-              <a:solidFill>
-                <a:schemeClr val="accent1">
-                  <a:lumMod val="75000"/>
-                </a:schemeClr>
-              </a:solidFill>
-            </a:endParaRPr>
-          </a:p>
-          <a:p>
-            <a:endParaRPr lang="en-US" dirty="0">
-              <a:solidFill>
-                <a:schemeClr val="accent1">
-                  <a:lumMod val="75000"/>
-                </a:schemeClr>
-              </a:solidFill>
-            </a:endParaRPr>
-          </a:p>
-          <a:p>
-            <a:endParaRPr lang="en-US" dirty="0" smtClean="0">
-              <a:solidFill>
-                <a:schemeClr val="accent1">
-                  <a:lumMod val="75000"/>
-                </a:schemeClr>
-              </a:solidFill>
-            </a:endParaRPr>
-          </a:p>
-          <a:p>
-            <a:endParaRPr lang="en-US" dirty="0">
-              <a:solidFill>
-                <a:schemeClr val="accent1">
-                  <a:lumMod val="75000"/>
-                </a:schemeClr>
-              </a:solidFill>
-            </a:endParaRPr>
-          </a:p>
-          <a:p>
-            <a:endParaRPr lang="en-US" dirty="0" smtClean="0">
-              <a:solidFill>
-                <a:schemeClr val="accent1">
-                  <a:lumMod val="75000"/>
-                </a:schemeClr>
-              </a:solidFill>
-            </a:endParaRPr>
-          </a:p>
-          <a:p>
-            <a:endParaRPr lang="en-US" dirty="0">
-              <a:solidFill>
-                <a:schemeClr val="accent1">
-                  <a:lumMod val="75000"/>
-                </a:schemeClr>
-              </a:solidFill>
-            </a:endParaRPr>
-          </a:p>
-          <a:p>
-            <a:endParaRPr lang="en-US" dirty="0" smtClean="0">
-              <a:solidFill>
-                <a:schemeClr val="accent1">
-                  <a:lumMod val="75000"/>
-                </a:schemeClr>
-              </a:solidFill>
-            </a:endParaRPr>
-          </a:p>
-          <a:p>
-            <a:endParaRPr lang="en-US" dirty="0">
-              <a:solidFill>
-                <a:schemeClr val="accent1">
-                  <a:lumMod val="75000"/>
-                </a:schemeClr>
-              </a:solidFill>
-            </a:endParaRPr>
-          </a:p>
-          <a:p>
-            <a:endParaRPr lang="en-US" dirty="0" smtClean="0">
-              <a:solidFill>
-                <a:schemeClr val="accent1">
-                  <a:lumMod val="75000"/>
-                </a:schemeClr>
-              </a:solidFill>
-            </a:endParaRPr>
-          </a:p>
-          <a:p>
-            <a:endParaRPr lang="en-US" dirty="0" smtClean="0">
-              <a:solidFill>
-                <a:schemeClr val="accent1">
-                  <a:lumMod val="75000"/>
-                </a:schemeClr>
-              </a:solidFill>
-            </a:endParaRPr>
-          </a:p>
-        </p:txBody>
-      </p:sp>
-      <p:graphicFrame>
-        <p:nvGraphicFramePr>
-          <p:cNvPr id="5" name="Object 4"/>
-          <p:cNvGraphicFramePr>
-            <a:graphicFrameLocks noChangeAspect="1"/>
-          </p:cNvGraphicFramePr>
-          <p:nvPr>
-            <p:extLst>
-              <p:ext uri="{D42A27DB-BD31-4B8C-83A1-F6EECF244321}">
-                <p14:modId xmlns:p14="http://schemas.microsoft.com/office/powerpoint/2010/main" val="54787183"/>
-              </p:ext>
-            </p:extLst>
-          </p:nvPr>
-        </p:nvGraphicFramePr>
-        <p:xfrm>
-          <a:off x="2895600" y="762000"/>
-          <a:ext cx="5864226" cy="1638300"/>
-        </p:xfrm>
-        <a:graphic>
-          <a:graphicData uri="http://schemas.openxmlformats.org/presentationml/2006/ole">
-            <mc:AlternateContent xmlns:mc="http://schemas.openxmlformats.org/markup-compatibility/2006">
-              <mc:Choice xmlns:v="urn:schemas-microsoft-com:vml" Requires="v">
-                <p:oleObj spid="_x0000_s21510" name="Equation" r:id="rId4" imgW="2730500" imgH="762000" progId="Equation.3">
-                  <p:embed/>
-                </p:oleObj>
-              </mc:Choice>
-              <mc:Fallback>
-                <p:oleObj name="Equation" r:id="rId4" imgW="2730500" imgH="762000" progId="Equation.3">
-                  <p:embed/>
-                  <p:pic>
-                    <p:nvPicPr>
-                      <p:cNvPr id="0" name=""/>
-                      <p:cNvPicPr/>
-                      <p:nvPr/>
-                    </p:nvPicPr>
-                    <p:blipFill>
-                      <a:blip r:embed="rId5"/>
-                      <a:stretch>
-                        <a:fillRect/>
-                      </a:stretch>
-                    </p:blipFill>
-                    <p:spPr>
-                      <a:xfrm>
-                        <a:off x="2895600" y="762000"/>
-                        <a:ext cx="5864226" cy="1638300"/>
-                      </a:xfrm>
-                      <a:prstGeom prst="rect">
-                        <a:avLst/>
-                      </a:prstGeom>
-                    </p:spPr>
-                  </p:pic>
-                </p:oleObj>
-              </mc:Fallback>
-            </mc:AlternateContent>
-          </a:graphicData>
-        </a:graphic>
-      </p:graphicFrame>
-      <p:graphicFrame>
-        <p:nvGraphicFramePr>
-          <p:cNvPr id="7" name="Object 6"/>
-          <p:cNvGraphicFramePr>
-            <a:graphicFrameLocks noChangeAspect="1"/>
-          </p:cNvGraphicFramePr>
-          <p:nvPr>
-            <p:extLst>
-              <p:ext uri="{D42A27DB-BD31-4B8C-83A1-F6EECF244321}">
-                <p14:modId xmlns:p14="http://schemas.microsoft.com/office/powerpoint/2010/main" val="671650713"/>
-              </p:ext>
-            </p:extLst>
-          </p:nvPr>
-        </p:nvGraphicFramePr>
-        <p:xfrm>
-          <a:off x="609600" y="1143000"/>
-          <a:ext cx="2100262" cy="928688"/>
-        </p:xfrm>
-        <a:graphic>
-          <a:graphicData uri="http://schemas.openxmlformats.org/presentationml/2006/ole">
-            <mc:AlternateContent xmlns:mc="http://schemas.openxmlformats.org/markup-compatibility/2006">
-              <mc:Choice xmlns:v="urn:schemas-microsoft-com:vml" Requires="v">
-                <p:oleObj spid="_x0000_s21511" name="Equation" r:id="rId6" imgW="977900" imgH="431800" progId="Equation.3">
-                  <p:embed/>
-                </p:oleObj>
-              </mc:Choice>
-              <mc:Fallback>
-                <p:oleObj name="Equation" r:id="rId6" imgW="977900" imgH="431800" progId="Equation.3">
-                  <p:embed/>
-                  <p:pic>
-                    <p:nvPicPr>
-                      <p:cNvPr id="0" name=""/>
-                      <p:cNvPicPr/>
-                      <p:nvPr/>
-                    </p:nvPicPr>
-                    <p:blipFill>
-                      <a:blip r:embed="rId7"/>
-                      <a:stretch>
-                        <a:fillRect/>
-                      </a:stretch>
-                    </p:blipFill>
-                    <p:spPr>
-                      <a:xfrm>
-                        <a:off x="609600" y="1143000"/>
-                        <a:ext cx="2100262" cy="928688"/>
-                      </a:xfrm>
-                      <a:prstGeom prst="rect">
-                        <a:avLst/>
-                      </a:prstGeom>
-                    </p:spPr>
-                  </p:pic>
-                </p:oleObj>
-              </mc:Fallback>
-            </mc:AlternateContent>
-          </a:graphicData>
-        </a:graphic>
-      </p:graphicFrame>
-      <p:graphicFrame>
-        <p:nvGraphicFramePr>
-          <p:cNvPr id="8" name="Object 7"/>
-          <p:cNvGraphicFramePr>
-            <a:graphicFrameLocks noChangeAspect="1"/>
-          </p:cNvGraphicFramePr>
-          <p:nvPr>
-            <p:extLst>
-              <p:ext uri="{D42A27DB-BD31-4B8C-83A1-F6EECF244321}">
-                <p14:modId xmlns:p14="http://schemas.microsoft.com/office/powerpoint/2010/main" val="518513296"/>
-              </p:ext>
-            </p:extLst>
-          </p:nvPr>
-        </p:nvGraphicFramePr>
-        <p:xfrm>
-          <a:off x="762000" y="2362200"/>
-          <a:ext cx="7254876" cy="982662"/>
-        </p:xfrm>
-        <a:graphic>
-          <a:graphicData uri="http://schemas.openxmlformats.org/presentationml/2006/ole">
-            <mc:AlternateContent xmlns:mc="http://schemas.openxmlformats.org/markup-compatibility/2006">
-              <mc:Choice xmlns:v="urn:schemas-microsoft-com:vml" Requires="v">
-                <p:oleObj spid="_x0000_s21512" name="Equation" r:id="rId8" imgW="3378200" imgH="457200" progId="Equation.3">
-                  <p:embed/>
-                </p:oleObj>
-              </mc:Choice>
-              <mc:Fallback>
-                <p:oleObj name="Equation" r:id="rId8" imgW="3378200" imgH="457200" progId="Equation.3">
-                  <p:embed/>
-                  <p:pic>
-                    <p:nvPicPr>
-                      <p:cNvPr id="0" name=""/>
-                      <p:cNvPicPr/>
-                      <p:nvPr/>
-                    </p:nvPicPr>
-                    <p:blipFill>
-                      <a:blip r:embed="rId9"/>
-                      <a:stretch>
-                        <a:fillRect/>
-                      </a:stretch>
-                    </p:blipFill>
-                    <p:spPr>
-                      <a:xfrm>
-                        <a:off x="762000" y="2362200"/>
-                        <a:ext cx="7254876" cy="982662"/>
-                      </a:xfrm>
-                      <a:prstGeom prst="rect">
-                        <a:avLst/>
-                      </a:prstGeom>
-                    </p:spPr>
-                  </p:pic>
-                </p:oleObj>
-              </mc:Fallback>
-            </mc:AlternateContent>
-          </a:graphicData>
-        </a:graphic>
-      </p:graphicFrame>
-      <p:graphicFrame>
-        <p:nvGraphicFramePr>
-          <p:cNvPr id="9" name="Object 8"/>
-          <p:cNvGraphicFramePr>
-            <a:graphicFrameLocks noChangeAspect="1"/>
-          </p:cNvGraphicFramePr>
-          <p:nvPr>
-            <p:extLst>
-              <p:ext uri="{D42A27DB-BD31-4B8C-83A1-F6EECF244321}">
-                <p14:modId xmlns:p14="http://schemas.microsoft.com/office/powerpoint/2010/main" val="548607891"/>
-              </p:ext>
-            </p:extLst>
-          </p:nvPr>
-        </p:nvGraphicFramePr>
-        <p:xfrm>
-          <a:off x="609600" y="3200400"/>
-          <a:ext cx="8293100" cy="3055938"/>
-        </p:xfrm>
-        <a:graphic>
-          <a:graphicData uri="http://schemas.openxmlformats.org/presentationml/2006/ole">
-            <mc:AlternateContent xmlns:mc="http://schemas.openxmlformats.org/markup-compatibility/2006">
-              <mc:Choice xmlns:v="urn:schemas-microsoft-com:vml" Requires="v">
-                <p:oleObj spid="_x0000_s21513" name="Equation" r:id="rId10" imgW="3860800" imgH="1422400" progId="Equation.3">
-                  <p:embed/>
-                </p:oleObj>
-              </mc:Choice>
-              <mc:Fallback>
-                <p:oleObj name="Equation" r:id="rId10" imgW="3860800" imgH="1422400" progId="Equation.3">
-                  <p:embed/>
-                  <p:pic>
-                    <p:nvPicPr>
-                      <p:cNvPr id="0" name=""/>
-                      <p:cNvPicPr/>
-                      <p:nvPr/>
-                    </p:nvPicPr>
-                    <p:blipFill>
-                      <a:blip r:embed="rId11"/>
-                      <a:stretch>
-                        <a:fillRect/>
-                      </a:stretch>
-                    </p:blipFill>
-                    <p:spPr>
-                      <a:xfrm>
-                        <a:off x="609600" y="3200400"/>
-                        <a:ext cx="8293100" cy="3055938"/>
-                      </a:xfrm>
-                      <a:prstGeom prst="rect">
-                        <a:avLst/>
-                      </a:prstGeom>
-                    </p:spPr>
-                  </p:pic>
-                </p:oleObj>
-              </mc:Fallback>
-            </mc:AlternateContent>
-          </a:graphicData>
-        </a:graphic>
-      </p:graphicFrame>
-    </p:spTree>
-    <p:extLst>
-      <p:ext uri="{BB962C8B-B14F-4D97-AF65-F5344CB8AC3E}">
-        <p14:creationId xmlns:p14="http://schemas.microsoft.com/office/powerpoint/2010/main" val="279509402"/>
-      </p:ext>
-    </p:extLst>
-  </p:cSld>
-  <p:clrMapOvr>
-    <a:masterClrMapping/>
-  </p:clrMapOvr>
-  <p:timing>
-    <p:tnLst>
-      <p:par>
-        <p:cTn xmlns:p14="http://schemas.microsoft.com/office/powerpoint/2010/main" id="1" dur="indefinite" restart="never" nodeType="tmRoot"/>
-      </p:par>
-    </p:tnLst>
-  </p:timing>
-</p:sld>
-</file>
-
 <file path=ppt/slides/slide2.xml><?xml version="1.0" encoding="utf-8"?>
 <p:sld xmlns:a="http://schemas.openxmlformats.org/drawingml/2006/main" xmlns:r="http://schemas.openxmlformats.org/officeDocument/2006/relationships" xmlns:p="http://schemas.openxmlformats.org/presentationml/2006/main">
   <p:cSld>
@@ -9025,7 +6780,7 @@
           <a:graphicData uri="http://schemas.openxmlformats.org/presentationml/2006/ole">
             <mc:AlternateContent xmlns:mc="http://schemas.openxmlformats.org/markup-compatibility/2006">
               <mc:Choice xmlns:v="urn:schemas-microsoft-com:vml" Requires="v">
-                <p:oleObj spid="_x0000_s1118" name="Equation" r:id="rId4" imgW="2095500" imgH="584200" progId="Equation.3">
+                <p:oleObj spid="_x0000_s1128" name="Equation" r:id="rId4" imgW="2095500" imgH="584200" progId="Equation.3">
                   <p:embed/>
                 </p:oleObj>
               </mc:Choice>
@@ -9082,7 +6837,7 @@
           <a:graphicData uri="http://schemas.openxmlformats.org/presentationml/2006/ole">
             <mc:AlternateContent xmlns:mc="http://schemas.openxmlformats.org/markup-compatibility/2006">
               <mc:Choice xmlns:v="urn:schemas-microsoft-com:vml" Requires="v">
-                <p:oleObj spid="_x0000_s1119" name="Equation" r:id="rId6" imgW="1295400" imgH="266700" progId="Equation.3">
+                <p:oleObj spid="_x0000_s1129" name="Equation" r:id="rId6" imgW="1295400" imgH="266700" progId="Equation.3">
                   <p:embed/>
                 </p:oleObj>
               </mc:Choice>
@@ -9139,7 +6894,7 @@
           <a:graphicData uri="http://schemas.openxmlformats.org/presentationml/2006/ole">
             <mc:AlternateContent xmlns:mc="http://schemas.openxmlformats.org/markup-compatibility/2006">
               <mc:Choice xmlns:v="urn:schemas-microsoft-com:vml" Requires="v">
-                <p:oleObj spid="_x0000_s1120" name="Equation" r:id="rId8" imgW="1308100" imgH="342900" progId="Equation.3">
+                <p:oleObj spid="_x0000_s1130" name="Equation" r:id="rId8" imgW="1308100" imgH="342900" progId="Equation.3">
                   <p:embed/>
                 </p:oleObj>
               </mc:Choice>
@@ -9196,7 +6951,7 @@
           <a:graphicData uri="http://schemas.openxmlformats.org/presentationml/2006/ole">
             <mc:AlternateContent xmlns:mc="http://schemas.openxmlformats.org/markup-compatibility/2006">
               <mc:Choice xmlns:v="urn:schemas-microsoft-com:vml" Requires="v">
-                <p:oleObj spid="_x0000_s1121" name="Equation" r:id="rId10" imgW="723900" imgH="215900" progId="Equation.3">
+                <p:oleObj spid="_x0000_s1131" name="Equation" r:id="rId10" imgW="723900" imgH="215900" progId="Equation.3">
                   <p:embed/>
                 </p:oleObj>
               </mc:Choice>
@@ -9253,7 +7008,7 @@
           <a:graphicData uri="http://schemas.openxmlformats.org/presentationml/2006/ole">
             <mc:AlternateContent xmlns:mc="http://schemas.openxmlformats.org/markup-compatibility/2006">
               <mc:Choice xmlns:v="urn:schemas-microsoft-com:vml" Requires="v">
-                <p:oleObj spid="_x0000_s1122" name="Equation" r:id="rId12" imgW="673100" imgH="203200" progId="Equation.3">
+                <p:oleObj spid="_x0000_s1132" name="Equation" r:id="rId12" imgW="673100" imgH="203200" progId="Equation.3">
                   <p:embed/>
                 </p:oleObj>
               </mc:Choice>
@@ -9310,7 +7065,7 @@
           <a:graphicData uri="http://schemas.openxmlformats.org/presentationml/2006/ole">
             <mc:AlternateContent xmlns:mc="http://schemas.openxmlformats.org/markup-compatibility/2006">
               <mc:Choice xmlns:v="urn:schemas-microsoft-com:vml" Requires="v">
-                <p:oleObj spid="_x0000_s1123" name="Equation" r:id="rId14" imgW="698500" imgH="812800" progId="Equation.3">
+                <p:oleObj spid="_x0000_s1133" name="Equation" r:id="rId14" imgW="698500" imgH="812800" progId="Equation.3">
                   <p:embed/>
                 </p:oleObj>
               </mc:Choice>
@@ -9367,7 +7122,7 @@
           <a:graphicData uri="http://schemas.openxmlformats.org/presentationml/2006/ole">
             <mc:AlternateContent xmlns:mc="http://schemas.openxmlformats.org/markup-compatibility/2006">
               <mc:Choice xmlns:v="urn:schemas-microsoft-com:vml" Requires="v">
-                <p:oleObj spid="_x0000_s1124" name="Equation" r:id="rId16" imgW="660400" imgH="812800" progId="Equation.3">
+                <p:oleObj spid="_x0000_s1134" name="Equation" r:id="rId16" imgW="660400" imgH="812800" progId="Equation.3">
                   <p:embed/>
                 </p:oleObj>
               </mc:Choice>
@@ -9424,7 +7179,7 @@
           <a:graphicData uri="http://schemas.openxmlformats.org/presentationml/2006/ole">
             <mc:AlternateContent xmlns:mc="http://schemas.openxmlformats.org/markup-compatibility/2006">
               <mc:Choice xmlns:v="urn:schemas-microsoft-com:vml" Requires="v">
-                <p:oleObj spid="_x0000_s1125" name="Equation" r:id="rId18" imgW="635000" imgH="812800" progId="Equation.3">
+                <p:oleObj spid="_x0000_s1135" name="Equation" r:id="rId18" imgW="635000" imgH="812800" progId="Equation.3">
                   <p:embed/>
                 </p:oleObj>
               </mc:Choice>
@@ -9481,7 +7236,7 @@
           <a:graphicData uri="http://schemas.openxmlformats.org/presentationml/2006/ole">
             <mc:AlternateContent xmlns:mc="http://schemas.openxmlformats.org/markup-compatibility/2006">
               <mc:Choice xmlns:v="urn:schemas-microsoft-com:vml" Requires="v">
-                <p:oleObj spid="_x0000_s1126" name="Equation" r:id="rId20" imgW="876300" imgH="266700" progId="Equation.3">
+                <p:oleObj spid="_x0000_s1136" name="Equation" r:id="rId20" imgW="876300" imgH="266700" progId="Equation.3">
                   <p:embed/>
                 </p:oleObj>
               </mc:Choice>
@@ -9975,7 +7730,7 @@
           <a:graphicData uri="http://schemas.openxmlformats.org/presentationml/2006/ole">
             <mc:AlternateContent xmlns:mc="http://schemas.openxmlformats.org/markup-compatibility/2006">
               <mc:Choice xmlns:v="urn:schemas-microsoft-com:vml" Requires="v">
-                <p:oleObj spid="_x0000_s5145" name="Equation" r:id="rId4" imgW="3175000" imgH="584200" progId="Equation.3">
+                <p:oleObj spid="_x0000_s5148" name="Equation" r:id="rId4" imgW="3175000" imgH="584200" progId="Equation.3">
                   <p:embed/>
                 </p:oleObj>
               </mc:Choice>
@@ -10032,7 +7787,7 @@
           <a:graphicData uri="http://schemas.openxmlformats.org/presentationml/2006/ole">
             <mc:AlternateContent xmlns:mc="http://schemas.openxmlformats.org/markup-compatibility/2006">
               <mc:Choice xmlns:v="urn:schemas-microsoft-com:vml" Requires="v">
-                <p:oleObj spid="_x0000_s5146" name="Equation" r:id="rId6" imgW="1511300" imgH="787400" progId="Equation.3">
+                <p:oleObj spid="_x0000_s5149" name="Equation" r:id="rId6" imgW="1511300" imgH="787400" progId="Equation.3">
                   <p:embed/>
                 </p:oleObj>
               </mc:Choice>
@@ -10431,7 +8186,7 @@
           <a:graphicData uri="http://schemas.openxmlformats.org/presentationml/2006/ole">
             <mc:AlternateContent xmlns:mc="http://schemas.openxmlformats.org/markup-compatibility/2006">
               <mc:Choice xmlns:v="urn:schemas-microsoft-com:vml" Requires="v">
-                <p:oleObj spid="_x0000_s8205" name="Equation" r:id="rId4" imgW="2527300" imgH="2159000" progId="Equation.3">
+                <p:oleObj spid="_x0000_s8208" name="Equation" r:id="rId4" imgW="2527300" imgH="2159000" progId="Equation.3">
                   <p:embed/>
                 </p:oleObj>
               </mc:Choice>
@@ -10488,7 +8243,7 @@
           <a:graphicData uri="http://schemas.openxmlformats.org/presentationml/2006/ole">
             <mc:AlternateContent xmlns:mc="http://schemas.openxmlformats.org/markup-compatibility/2006">
               <mc:Choice xmlns:v="urn:schemas-microsoft-com:vml" Requires="v">
-                <p:oleObj spid="_x0000_s8206" name="Equation" r:id="rId6" imgW="3276600" imgH="558800" progId="Equation.3">
+                <p:oleObj spid="_x0000_s8209" name="Equation" r:id="rId6" imgW="3276600" imgH="558800" progId="Equation.3">
                   <p:embed/>
                 </p:oleObj>
               </mc:Choice>
@@ -10887,7 +8642,7 @@
           <a:graphicData uri="http://schemas.openxmlformats.org/presentationml/2006/ole">
             <mc:AlternateContent xmlns:mc="http://schemas.openxmlformats.org/markup-compatibility/2006">
               <mc:Choice xmlns:v="urn:schemas-microsoft-com:vml" Requires="v">
-                <p:oleObj spid="_x0000_s9229" name="Equation" r:id="rId4" imgW="2527300" imgH="2159000" progId="Equation.3">
+                <p:oleObj spid="_x0000_s9232" name="Equation" r:id="rId4" imgW="2527300" imgH="2159000" progId="Equation.3">
                   <p:embed/>
                 </p:oleObj>
               </mc:Choice>
@@ -10944,7 +8699,7 @@
           <a:graphicData uri="http://schemas.openxmlformats.org/presentationml/2006/ole">
             <mc:AlternateContent xmlns:mc="http://schemas.openxmlformats.org/markup-compatibility/2006">
               <mc:Choice xmlns:v="urn:schemas-microsoft-com:vml" Requires="v">
-                <p:oleObj spid="_x0000_s9230" name="Equation" r:id="rId6" imgW="3276600" imgH="558800" progId="Equation.3">
+                <p:oleObj spid="_x0000_s9233" name="Equation" r:id="rId6" imgW="3276600" imgH="558800" progId="Equation.3">
                   <p:embed/>
                 </p:oleObj>
               </mc:Choice>
@@ -11320,7 +9075,7 @@
           <a:graphicData uri="http://schemas.openxmlformats.org/presentationml/2006/ole">
             <mc:AlternateContent xmlns:mc="http://schemas.openxmlformats.org/markup-compatibility/2006">
               <mc:Choice xmlns:v="urn:schemas-microsoft-com:vml" Requires="v">
-                <p:oleObj spid="_x0000_s3097" name="Equation" r:id="rId4" imgW="1536700" imgH="508000" progId="Equation.3">
+                <p:oleObj spid="_x0000_s3101" name="Equation" r:id="rId4" imgW="1536700" imgH="508000" progId="Equation.3">
                   <p:embed/>
                 </p:oleObj>
               </mc:Choice>
@@ -11377,7 +9132,7 @@
           <a:graphicData uri="http://schemas.openxmlformats.org/presentationml/2006/ole">
             <mc:AlternateContent xmlns:mc="http://schemas.openxmlformats.org/markup-compatibility/2006">
               <mc:Choice xmlns:v="urn:schemas-microsoft-com:vml" Requires="v">
-                <p:oleObj spid="_x0000_s3098" name="Equation" r:id="rId6" imgW="2324100" imgH="1079500" progId="Equation.3">
+                <p:oleObj spid="_x0000_s3102" name="Equation" r:id="rId6" imgW="2324100" imgH="1079500" progId="Equation.3">
                   <p:embed/>
                 </p:oleObj>
               </mc:Choice>
@@ -11434,7 +9189,7 @@
           <a:graphicData uri="http://schemas.openxmlformats.org/presentationml/2006/ole">
             <mc:AlternateContent xmlns:mc="http://schemas.openxmlformats.org/markup-compatibility/2006">
               <mc:Choice xmlns:v="urn:schemas-microsoft-com:vml" Requires="v">
-                <p:oleObj spid="_x0000_s3099" name="Equation" r:id="rId8" imgW="838200" imgH="457200" progId="Equation.3">
+                <p:oleObj spid="_x0000_s3103" name="Equation" r:id="rId8" imgW="838200" imgH="457200" progId="Equation.3">
                   <p:embed/>
                 </p:oleObj>
               </mc:Choice>
@@ -11814,7 +9569,7 @@
           <a:graphicData uri="http://schemas.openxmlformats.org/presentationml/2006/ole">
             <mc:AlternateContent xmlns:mc="http://schemas.openxmlformats.org/markup-compatibility/2006">
               <mc:Choice xmlns:v="urn:schemas-microsoft-com:vml" Requires="v">
-                <p:oleObj spid="_x0000_s2098" name="Equation" r:id="rId4" imgW="2247900" imgH="330200" progId="Equation.3">
+                <p:oleObj spid="_x0000_s2102" name="Equation" r:id="rId4" imgW="2247900" imgH="330200" progId="Equation.3">
                   <p:embed/>
                 </p:oleObj>
               </mc:Choice>
@@ -11871,7 +9626,7 @@
           <a:graphicData uri="http://schemas.openxmlformats.org/presentationml/2006/ole">
             <mc:AlternateContent xmlns:mc="http://schemas.openxmlformats.org/markup-compatibility/2006">
               <mc:Choice xmlns:v="urn:schemas-microsoft-com:vml" Requires="v">
-                <p:oleObj spid="_x0000_s2099" name="Equation" r:id="rId6" imgW="825500" imgH="342900" progId="Equation.3">
+                <p:oleObj spid="_x0000_s2103" name="Equation" r:id="rId6" imgW="825500" imgH="342900" progId="Equation.3">
                   <p:embed/>
                 </p:oleObj>
               </mc:Choice>
@@ -11928,7 +9683,7 @@
           <a:graphicData uri="http://schemas.openxmlformats.org/presentationml/2006/ole">
             <mc:AlternateContent xmlns:mc="http://schemas.openxmlformats.org/markup-compatibility/2006">
               <mc:Choice xmlns:v="urn:schemas-microsoft-com:vml" Requires="v">
-                <p:oleObj spid="_x0000_s2100" name="Equation" r:id="rId8" imgW="3543300" imgH="1549400" progId="Equation.3">
+                <p:oleObj spid="_x0000_s2104" name="Equation" r:id="rId8" imgW="3543300" imgH="1549400" progId="Equation.3">
                   <p:embed/>
                 </p:oleObj>
               </mc:Choice>
@@ -12327,7 +10082,7 @@
           <a:graphicData uri="http://schemas.openxmlformats.org/presentationml/2006/ole">
             <mc:AlternateContent xmlns:mc="http://schemas.openxmlformats.org/markup-compatibility/2006">
               <mc:Choice xmlns:v="urn:schemas-microsoft-com:vml" Requires="v">
-                <p:oleObj spid="_x0000_s10257" name="Equation" r:id="rId4" imgW="2692400" imgH="508000" progId="Equation.3">
+                <p:oleObj spid="_x0000_s10261" name="Equation" r:id="rId4" imgW="2692400" imgH="508000" progId="Equation.3">
                   <p:embed/>
                 </p:oleObj>
               </mc:Choice>
@@ -12384,7 +10139,7 @@
           <a:graphicData uri="http://schemas.openxmlformats.org/presentationml/2006/ole">
             <mc:AlternateContent xmlns:mc="http://schemas.openxmlformats.org/markup-compatibility/2006">
               <mc:Choice xmlns:v="urn:schemas-microsoft-com:vml" Requires="v">
-                <p:oleObj spid="_x0000_s10258" name="Equation" r:id="rId6" imgW="2730500" imgH="431800" progId="Equation.3">
+                <p:oleObj spid="_x0000_s10262" name="Equation" r:id="rId6" imgW="2730500" imgH="431800" progId="Equation.3">
                   <p:embed/>
                 </p:oleObj>
               </mc:Choice>
@@ -12441,7 +10196,7 @@
           <a:graphicData uri="http://schemas.openxmlformats.org/presentationml/2006/ole">
             <mc:AlternateContent xmlns:mc="http://schemas.openxmlformats.org/markup-compatibility/2006">
               <mc:Choice xmlns:v="urn:schemas-microsoft-com:vml" Requires="v">
-                <p:oleObj spid="_x0000_s10259" name="Equation" r:id="rId8" imgW="2768600" imgH="431800" progId="Equation.3">
+                <p:oleObj spid="_x0000_s10263" name="Equation" r:id="rId8" imgW="2768600" imgH="431800" progId="Equation.3">
                   <p:embed/>
                 </p:oleObj>
               </mc:Choice>

</xml_diff>